<commit_message>
Final version of the presentation about the CI tool
</commit_message>
<xml_diff>
--- a/Andrzej_Szewczyk_Prezentacja_Seminarium_Dyplomowe.pptx
+++ b/Andrzej_Szewczyk_Prezentacja_Seminarium_Dyplomowe.pptx
@@ -5,10 +5,10 @@
     <p:sldMasterId id="2147483648" r:id="rId1"/>
   </p:sldMasterIdLst>
   <p:notesMasterIdLst>
-    <p:notesMasterId r:id="rId15"/>
+    <p:notesMasterId r:id="rId19"/>
   </p:notesMasterIdLst>
   <p:handoutMasterIdLst>
-    <p:handoutMasterId r:id="rId16"/>
+    <p:handoutMasterId r:id="rId20"/>
   </p:handoutMasterIdLst>
   <p:sldIdLst>
     <p:sldId id="331" r:id="rId2"/>
@@ -23,7 +23,11 @@
     <p:sldId id="352" r:id="rId11"/>
     <p:sldId id="353" r:id="rId12"/>
     <p:sldId id="354" r:id="rId13"/>
-    <p:sldId id="346" r:id="rId14"/>
+    <p:sldId id="356" r:id="rId14"/>
+    <p:sldId id="355" r:id="rId15"/>
+    <p:sldId id="346" r:id="rId16"/>
+    <p:sldId id="358" r:id="rId17"/>
+    <p:sldId id="357" r:id="rId18"/>
   </p:sldIdLst>
   <p:sldSz cx="9144000" cy="6858000" type="screen4x3"/>
   <p:notesSz cx="6858000" cy="9144000"/>
@@ -154,7 +158,7 @@
   </p:defaultTextStyle>
   <p:extLst>
     <p:ext uri="{EFAFB233-063F-42B5-8137-9DF3F51BA10A}">
-      <p15:sldGuideLst xmlns="" xmlns:p15="http://schemas.microsoft.com/office/powerpoint/2012/main">
+      <p15:sldGuideLst xmlns:p15="http://schemas.microsoft.com/office/powerpoint/2012/main">
         <p15:guide id="1" orient="horz" pos="2160">
           <p15:clr>
             <a:srgbClr val="A4A3A4"/>
@@ -1400,6 +1404,96 @@
 </p:notes>
 </file>
 
+<file path=ppt/notesSlides/notesSlide11.xml><?xml version="1.0" encoding="utf-8"?>
+<p:notes xmlns:a="http://schemas.openxmlformats.org/drawingml/2006/main" xmlns:r="http://schemas.openxmlformats.org/officeDocument/2006/relationships" xmlns:p="http://schemas.openxmlformats.org/presentationml/2006/main">
+  <p:cSld>
+    <p:spTree>
+      <p:nvGrpSpPr>
+        <p:cNvPr id="1" name=""/>
+        <p:cNvGrpSpPr/>
+        <p:nvPr/>
+      </p:nvGrpSpPr>
+      <p:grpSpPr>
+        <a:xfrm>
+          <a:off x="0" y="0"/>
+          <a:ext cx="0" cy="0"/>
+          <a:chOff x="0" y="0"/>
+          <a:chExt cx="0" cy="0"/>
+        </a:xfrm>
+      </p:grpSpPr>
+      <p:sp>
+        <p:nvSpPr>
+          <p:cNvPr id="2" name="Symbol zastępczy obrazu slajdu 1"/>
+          <p:cNvSpPr>
+            <a:spLocks noGrp="1" noRot="1" noChangeAspect="1"/>
+          </p:cNvSpPr>
+          <p:nvPr>
+            <p:ph type="sldImg"/>
+          </p:nvPr>
+        </p:nvSpPr>
+        <p:spPr/>
+      </p:sp>
+      <p:sp>
+        <p:nvSpPr>
+          <p:cNvPr id="3" name="Symbol zastępczy notatek 2"/>
+          <p:cNvSpPr>
+            <a:spLocks noGrp="1"/>
+          </p:cNvSpPr>
+          <p:nvPr>
+            <p:ph type="body" idx="1"/>
+          </p:nvPr>
+        </p:nvSpPr>
+        <p:spPr/>
+        <p:txBody>
+          <a:bodyPr/>
+          <a:lstStyle/>
+          <a:p>
+            <a:endParaRPr lang="en-US" dirty="0"/>
+          </a:p>
+        </p:txBody>
+      </p:sp>
+      <p:sp>
+        <p:nvSpPr>
+          <p:cNvPr id="4" name="Symbol zastępczy numeru slajdu 3"/>
+          <p:cNvSpPr>
+            <a:spLocks noGrp="1"/>
+          </p:cNvSpPr>
+          <p:nvPr>
+            <p:ph type="sldNum" sz="quarter" idx="10"/>
+          </p:nvPr>
+        </p:nvSpPr>
+        <p:spPr/>
+        <p:txBody>
+          <a:bodyPr/>
+          <a:lstStyle/>
+          <a:p>
+            <a:pPr>
+              <a:defRPr/>
+            </a:pPr>
+            <a:fld id="{2BE6C793-D432-4A40-A700-5DCD4EAAB2AA}" type="slidenum">
+              <a:rPr lang="en-GB" smtClean="0"/>
+              <a:pPr>
+                <a:defRPr/>
+              </a:pPr>
+              <a:t>14</a:t>
+            </a:fld>
+            <a:endParaRPr lang="en-GB"/>
+          </a:p>
+        </p:txBody>
+      </p:sp>
+    </p:spTree>
+    <p:extLst>
+      <p:ext uri="{BB962C8B-B14F-4D97-AF65-F5344CB8AC3E}">
+        <p14:creationId xmlns:p14="http://schemas.microsoft.com/office/powerpoint/2010/main" val="3241164290"/>
+      </p:ext>
+    </p:extLst>
+  </p:cSld>
+  <p:clrMapOvr>
+    <a:masterClrMapping/>
+  </p:clrMapOvr>
+</p:notes>
+</file>
+
 <file path=ppt/notesSlides/notesSlide2.xml><?xml version="1.0" encoding="utf-8"?>
 <p:notes xmlns:a="http://schemas.openxmlformats.org/drawingml/2006/main" xmlns:r="http://schemas.openxmlformats.org/officeDocument/2006/relationships" xmlns:p="http://schemas.openxmlformats.org/presentationml/2006/main">
   <p:cSld>
@@ -2256,7 +2350,7 @@
             </a:pPr>
             <a:fld id="{4221A833-F55D-40FD-A351-9E9F026D73CF}" type="datetime1">
               <a:rPr lang="en-US" smtClean="0"/>
-              <a:t>9/13/2018</a:t>
+              <a:t>9/14/2018</a:t>
             </a:fld>
             <a:endParaRPr lang="pl-PL"/>
           </a:p>
@@ -2460,7 +2554,7 @@
             </a:pPr>
             <a:fld id="{B181401E-963E-4FE9-B50C-9BD8A6873177}" type="datetime1">
               <a:rPr lang="en-US" smtClean="0"/>
-              <a:t>9/13/2018</a:t>
+              <a:t>9/14/2018</a:t>
             </a:fld>
             <a:endParaRPr lang="pl-PL"/>
           </a:p>
@@ -2674,7 +2768,7 @@
             </a:pPr>
             <a:fld id="{6B876BFD-AD81-4A7A-A93A-05ED54BC0113}" type="datetime1">
               <a:rPr lang="en-US" smtClean="0"/>
-              <a:t>9/13/2018</a:t>
+              <a:t>9/14/2018</a:t>
             </a:fld>
             <a:endParaRPr lang="pl-PL"/>
           </a:p>
@@ -2882,7 +2976,7 @@
             </a:pPr>
             <a:fld id="{859C3E08-3856-4993-B2D5-3225FCBDF97C}" type="datetime1">
               <a:rPr lang="en-US" smtClean="0"/>
-              <a:t>9/13/2018</a:t>
+              <a:t>9/14/2018</a:t>
             </a:fld>
             <a:endParaRPr lang="pl-PL"/>
           </a:p>
@@ -3116,7 +3210,7 @@
             </a:pPr>
             <a:fld id="{D00F0917-26D6-46D5-A8B6-E18B437EF79B}" type="datetime1">
               <a:rPr lang="en-US" smtClean="0"/>
-              <a:t>9/13/2018</a:t>
+              <a:t>9/14/2018</a:t>
             </a:fld>
             <a:endParaRPr lang="pl-PL"/>
           </a:p>
@@ -3438,7 +3532,7 @@
             </a:pPr>
             <a:fld id="{E22165FA-3C55-4061-BECA-3BD5BB8E56CB}" type="datetime1">
               <a:rPr lang="en-US" smtClean="0"/>
-              <a:t>9/13/2018</a:t>
+              <a:t>9/14/2018</a:t>
             </a:fld>
             <a:endParaRPr lang="pl-PL"/>
           </a:p>
@@ -3899,7 +3993,7 @@
             </a:pPr>
             <a:fld id="{4C65C24E-8FFF-495E-B3A3-0FD7BAA3E560}" type="datetime1">
               <a:rPr lang="en-US" smtClean="0"/>
-              <a:t>9/13/2018</a:t>
+              <a:t>9/14/2018</a:t>
             </a:fld>
             <a:endParaRPr lang="pl-PL"/>
           </a:p>
@@ -4051,7 +4145,7 @@
             </a:pPr>
             <a:fld id="{7C0CFBBD-1EE5-4D27-9A12-608198EECC63}" type="datetime1">
               <a:rPr lang="en-US" smtClean="0"/>
-              <a:t>9/13/2018</a:t>
+              <a:t>9/14/2018</a:t>
             </a:fld>
             <a:endParaRPr lang="pl-PL"/>
           </a:p>
@@ -4180,7 +4274,7 @@
             </a:pPr>
             <a:fld id="{D4A5FA91-EC9E-43A8-B3CB-830F6E2BDD09}" type="datetime1">
               <a:rPr lang="en-US" smtClean="0"/>
-              <a:t>9/13/2018</a:t>
+              <a:t>9/14/2018</a:t>
             </a:fld>
             <a:endParaRPr lang="pl-PL"/>
           </a:p>
@@ -4491,7 +4585,7 @@
             </a:pPr>
             <a:fld id="{CA5B0E47-5204-4743-9DE4-1ECDCEE7A901}" type="datetime1">
               <a:rPr lang="en-US" smtClean="0"/>
-              <a:t>9/13/2018</a:t>
+              <a:t>9/14/2018</a:t>
             </a:fld>
             <a:endParaRPr lang="pl-PL"/>
           </a:p>
@@ -4779,7 +4873,7 @@
             </a:pPr>
             <a:fld id="{F7933AFC-D8CF-4FFA-BC47-C586AD24B97C}" type="datetime1">
               <a:rPr lang="en-US" smtClean="0"/>
-              <a:t>9/13/2018</a:t>
+              <a:t>9/14/2018</a:t>
             </a:fld>
             <a:endParaRPr lang="pl-PL"/>
           </a:p>
@@ -5133,7 +5227,7 @@
             </a:pPr>
             <a:fld id="{814873AF-7426-4A08-9E1C-93101F0F686C}" type="datetime1">
               <a:rPr lang="en-US" smtClean="0"/>
-              <a:t>9/13/2018</a:t>
+              <a:t>9/14/2018</a:t>
             </a:fld>
             <a:endParaRPr lang="pl-PL"/>
           </a:p>
@@ -5715,9 +5809,9 @@
       </p:grpSpPr>
       <p:sp>
         <p:nvSpPr>
-          <p:cNvPr id="2050" name="Rectangle 2"/>
-          <p:cNvSpPr>
-            <a:spLocks noGrp="1" noChangeArrowheads="1"/>
+          <p:cNvPr id="4" name="Shape 87"/>
+          <p:cNvSpPr txBox="1">
+            <a:spLocks noGrp="1"/>
           </p:cNvSpPr>
           <p:nvPr>
             <p:ph type="ctrTitle"/>
@@ -5725,85 +5819,295 @@
         </p:nvSpPr>
         <p:spPr>
           <a:xfrm>
-            <a:off x="1578280" y="2592888"/>
-            <a:ext cx="7150854" cy="3820438"/>
+            <a:off x="861415" y="2266360"/>
+            <a:ext cx="7453745" cy="1632777"/>
           </a:xfrm>
+          <a:prstGeom prst="rect">
+            <a:avLst/>
+          </a:prstGeom>
           <a:noFill/>
+          <a:ln>
+            <a:noFill/>
+          </a:ln>
         </p:spPr>
         <p:txBody>
-          <a:bodyPr lIns="0" tIns="0" rIns="0" bIns="0" anchor="t"/>
+          <a:bodyPr spcFirstLastPara="1" wrap="square" lIns="0" tIns="0" rIns="0" bIns="0" anchor="t" anchorCtr="0">
+            <a:noAutofit/>
+          </a:bodyPr>
           <a:lstStyle/>
           <a:p>
-            <a:pPr eaLnBrk="1" hangingPunct="1"/>
-            <a:r>
-              <a:rPr lang="en-US" sz="2000" dirty="0" smtClean="0"/>
-              <a:t>Subject of the Master’s thesis:</a:t>
-            </a:r>
+            <a:pPr algn="ctr" fontAlgn="t"/>
+            <a:r>
+              <a:rPr lang="en-US" sz="2000" b="0" dirty="0"/>
+              <a:t>Subject of </a:t>
+            </a:r>
+            <a:r>
+              <a:rPr lang="pl-PL" sz="2000" b="0" dirty="0" smtClean="0"/>
+              <a:t>the </a:t>
+            </a:r>
+            <a:r>
+              <a:rPr lang="en-US" sz="2000" b="0" dirty="0" smtClean="0"/>
+              <a:t>Master’s thesis</a:t>
+            </a:r>
+            <a:r>
+              <a:rPr lang="en-US" sz="2000" b="0" dirty="0" smtClean="0"/>
+              <a:t>:</a:t>
+            </a:r>
+            <a:r>
+              <a:rPr lang="pl-PL" sz="2800" dirty="0" smtClean="0"/>
+              <a:t/>
+            </a:r>
+            <a:br>
+              <a:rPr lang="pl-PL" sz="2800" dirty="0" smtClean="0"/>
+            </a:br>
             <a:r>
               <a:rPr lang="en-US" sz="2800" dirty="0" smtClean="0"/>
+              <a:t>Continuous </a:t>
+            </a:r>
+            <a:r>
+              <a:rPr lang="en-US" sz="2800" dirty="0"/>
+              <a:t>integration tool that supports the process by an optimal test suite </a:t>
+            </a:r>
+            <a:r>
+              <a:rPr lang="en-US" sz="2800" dirty="0" smtClean="0"/>
+              <a:t>selection</a:t>
+            </a:r>
+            <a:r>
+              <a:rPr lang="pl-PL" sz="2800" dirty="0"/>
+              <a:t>.</a:t>
+            </a:r>
+            <a:r>
+              <a:rPr lang="en-US" sz="3200" b="0" dirty="0"/>
               <a:t/>
             </a:r>
             <a:br>
-              <a:rPr lang="en-US" sz="2800" dirty="0" smtClean="0"/>
+              <a:rPr lang="en-US" sz="3200" b="0" dirty="0"/>
             </a:br>
             <a:r>
-              <a:rPr lang="en-US" sz="2800" dirty="0" smtClean="0"/>
-              <a:t>Continuous integration tool that supports the process by an optimal test suite selection.</a:t>
+              <a:rPr lang="pl-PL" sz="3200" b="1" i="0" u="none" strike="noStrike" cap="none" dirty="0" smtClean="0">
+                <a:solidFill>
+                  <a:schemeClr val="dk2"/>
+                </a:solidFill>
+                <a:latin typeface="Verdana"/>
+                <a:ea typeface="Verdana"/>
+                <a:cs typeface="Verdana"/>
+                <a:sym typeface="Verdana"/>
+              </a:rPr>
+              <a:t/>
             </a:r>
             <a:br>
-              <a:rPr lang="en-US" sz="2800" dirty="0" smtClean="0"/>
+              <a:rPr lang="pl-PL" sz="3200" b="1" i="0" u="none" strike="noStrike" cap="none" dirty="0" smtClean="0">
+                <a:solidFill>
+                  <a:schemeClr val="dk2"/>
+                </a:solidFill>
+                <a:latin typeface="Verdana"/>
+                <a:ea typeface="Verdana"/>
+                <a:cs typeface="Verdana"/>
+                <a:sym typeface="Verdana"/>
+              </a:rPr>
             </a:br>
-            <a:r>
-              <a:rPr lang="en-US" sz="2800" dirty="0" smtClean="0"/>
-              <a:t/>
-            </a:r>
-            <a:br>
-              <a:rPr lang="en-US" sz="2800" dirty="0" smtClean="0"/>
-            </a:br>
-            <a:r>
-              <a:rPr lang="en-US" sz="2000" dirty="0" smtClean="0"/>
-              <a:t>Author:</a:t>
-            </a:r>
-            <a:br>
-              <a:rPr lang="en-US" sz="2000" dirty="0" smtClean="0"/>
-            </a:br>
-            <a:r>
-              <a:rPr lang="en-US" sz="2000" dirty="0" smtClean="0"/>
-              <a:t>Andrzej Szewczyk, Inżynieria Mechatroniczna, PM</a:t>
-            </a:r>
-            <a:r>
-              <a:rPr lang="en-US" dirty="0" smtClean="0"/>
-              <a:t/>
-            </a:r>
-            <a:br>
-              <a:rPr lang="en-US" dirty="0" smtClean="0"/>
-            </a:br>
-            <a:r>
-              <a:rPr lang="en-US" sz="2800" dirty="0" smtClean="0"/>
-              <a:t/>
-            </a:r>
-            <a:br>
-              <a:rPr lang="en-US" sz="2800" dirty="0" smtClean="0"/>
-            </a:br>
-            <a:r>
-              <a:rPr lang="en-US" sz="2000" dirty="0" smtClean="0"/>
-              <a:t>Supervisor:</a:t>
-            </a:r>
-            <a:br>
-              <a:rPr lang="en-US" sz="2000" dirty="0" smtClean="0"/>
-            </a:br>
-            <a:r>
-              <a:rPr lang="en-US" sz="2000" dirty="0" smtClean="0"/>
-              <a:t>dr inż. Lucjan Miękina</a:t>
-            </a:r>
-            <a:r>
-              <a:rPr lang="pl-PL" sz="3200" dirty="0"/>
-              <a:t/>
-            </a:r>
-            <a:br>
-              <a:rPr lang="pl-PL" sz="3200" dirty="0"/>
-            </a:br>
-            <a:endParaRPr lang="en-US" sz="2800" dirty="0"/>
+            <a:endParaRPr sz="3200" b="1" i="0" u="none" strike="noStrike" cap="none" dirty="0">
+              <a:solidFill>
+                <a:schemeClr val="dk2"/>
+              </a:solidFill>
+              <a:latin typeface="Verdana"/>
+              <a:ea typeface="Verdana"/>
+              <a:cs typeface="Verdana"/>
+              <a:sym typeface="Verdana"/>
+            </a:endParaRPr>
+          </a:p>
+        </p:txBody>
+      </p:sp>
+      <p:sp>
+        <p:nvSpPr>
+          <p:cNvPr id="5" name="Shape 88"/>
+          <p:cNvSpPr/>
+          <p:nvPr/>
+        </p:nvSpPr>
+        <p:spPr>
+          <a:xfrm>
+            <a:off x="2575126" y="4054414"/>
+            <a:ext cx="6491236" cy="2216989"/>
+          </a:xfrm>
+          <a:prstGeom prst="rect">
+            <a:avLst/>
+          </a:prstGeom>
+          <a:noFill/>
+          <a:ln>
+            <a:noFill/>
+          </a:ln>
+        </p:spPr>
+        <p:txBody>
+          <a:bodyPr spcFirstLastPara="1" wrap="square" lIns="0" tIns="0" rIns="0" bIns="0" anchor="t" anchorCtr="0">
+            <a:noAutofit/>
+          </a:bodyPr>
+          <a:lstStyle/>
+          <a:p>
+            <a:pPr>
+              <a:lnSpc>
+                <a:spcPct val="150000"/>
+              </a:lnSpc>
+            </a:pPr>
+            <a:r>
+              <a:rPr lang="en-US" b="1" dirty="0" smtClean="0">
+                <a:latin typeface="Verdana"/>
+                <a:ea typeface="Verdana"/>
+                <a:cs typeface="Verdana"/>
+                <a:sym typeface="Verdana"/>
+              </a:rPr>
+              <a:t>Author: 	</a:t>
+            </a:r>
+            <a:r>
+              <a:rPr lang="en-US" sz="1600" b="1" dirty="0" smtClean="0">
+                <a:latin typeface="Verdana"/>
+                <a:ea typeface="Verdana"/>
+                <a:cs typeface="Verdana"/>
+                <a:sym typeface="Verdana"/>
+              </a:rPr>
+              <a:t>	Andrzej Szewczyk	</a:t>
+            </a:r>
+          </a:p>
+          <a:p>
+            <a:pPr>
+              <a:lnSpc>
+                <a:spcPct val="150000"/>
+              </a:lnSpc>
+            </a:pPr>
+            <a:r>
+              <a:rPr lang="en-US" dirty="0" smtClean="0">
+                <a:ea typeface="Verdana" panose="020B0604030504040204" pitchFamily="34" charset="0"/>
+                <a:cs typeface="Verdana" panose="020B0604030504040204" pitchFamily="34" charset="0"/>
+              </a:rPr>
+              <a:t>Field of Study: </a:t>
+            </a:r>
+            <a:r>
+              <a:rPr lang="en-US" sz="1600" dirty="0" smtClean="0">
+                <a:ea typeface="Verdana" panose="020B0604030504040204" pitchFamily="34" charset="0"/>
+                <a:cs typeface="Verdana" panose="020B0604030504040204" pitchFamily="34" charset="0"/>
+              </a:rPr>
+              <a:t>	</a:t>
+            </a:r>
+            <a:r>
+              <a:rPr lang="pl-PL" sz="1600" dirty="0" smtClean="0">
+                <a:ea typeface="Verdana" panose="020B0604030504040204" pitchFamily="34" charset="0"/>
+                <a:cs typeface="Verdana" panose="020B0604030504040204" pitchFamily="34" charset="0"/>
+              </a:rPr>
+              <a:t>	</a:t>
+            </a:r>
+            <a:r>
+              <a:rPr lang="en-US" sz="1600" dirty="0" smtClean="0">
+                <a:ea typeface="Verdana" panose="020B0604030504040204" pitchFamily="34" charset="0"/>
+                <a:cs typeface="Verdana" panose="020B0604030504040204" pitchFamily="34" charset="0"/>
+              </a:rPr>
+              <a:t>Mechatronics engineering	</a:t>
+            </a:r>
+          </a:p>
+          <a:p>
+            <a:pPr>
+              <a:lnSpc>
+                <a:spcPct val="150000"/>
+              </a:lnSpc>
+            </a:pPr>
+            <a:r>
+              <a:rPr lang="en-US" dirty="0" smtClean="0">
+                <a:ea typeface="Verdana" panose="020B0604030504040204" pitchFamily="34" charset="0"/>
+                <a:cs typeface="Verdana" panose="020B0604030504040204" pitchFamily="34" charset="0"/>
+              </a:rPr>
+              <a:t>Specializations: </a:t>
+            </a:r>
+            <a:r>
+              <a:rPr lang="en-US" sz="1600" dirty="0" smtClean="0">
+                <a:ea typeface="Verdana" panose="020B0604030504040204" pitchFamily="34" charset="0"/>
+                <a:cs typeface="Verdana" panose="020B0604030504040204" pitchFamily="34" charset="0"/>
+              </a:rPr>
+              <a:t>	Mechatronics design	</a:t>
+            </a:r>
+          </a:p>
+          <a:p>
+            <a:pPr algn="r">
+              <a:lnSpc>
+                <a:spcPct val="150000"/>
+              </a:lnSpc>
+            </a:pPr>
+            <a:endParaRPr lang="en-US" sz="1600" b="1" dirty="0" smtClean="0">
+              <a:latin typeface="Verdana"/>
+              <a:ea typeface="Verdana"/>
+              <a:cs typeface="Verdana"/>
+              <a:sym typeface="Verdana"/>
+            </a:endParaRPr>
+          </a:p>
+          <a:p>
+            <a:pPr marL="0" marR="0" lvl="0" indent="0" rtl="0">
+              <a:lnSpc>
+                <a:spcPct val="150000"/>
+              </a:lnSpc>
+              <a:spcBef>
+                <a:spcPts val="0"/>
+              </a:spcBef>
+              <a:spcAft>
+                <a:spcPts val="0"/>
+              </a:spcAft>
+              <a:buNone/>
+            </a:pPr>
+            <a:r>
+              <a:rPr lang="en-US" b="1" dirty="0" smtClean="0">
+                <a:latin typeface="Verdana"/>
+                <a:ea typeface="Verdana"/>
+                <a:cs typeface="Verdana"/>
+                <a:sym typeface="Verdana"/>
+              </a:rPr>
+              <a:t>Supervisor: </a:t>
+            </a:r>
+            <a:r>
+              <a:rPr lang="en-US" sz="1600" b="1" dirty="0" smtClean="0">
+                <a:latin typeface="Verdana"/>
+                <a:ea typeface="Verdana"/>
+                <a:cs typeface="Verdana"/>
+                <a:sym typeface="Verdana"/>
+              </a:rPr>
+              <a:t>	dr inż. Lucjan Miękina</a:t>
+            </a:r>
+          </a:p>
+          <a:p>
+            <a:pPr>
+              <a:lnSpc>
+                <a:spcPct val="150000"/>
+              </a:lnSpc>
+            </a:pPr>
+            <a:r>
+              <a:rPr lang="en-US" b="1" dirty="0" smtClean="0">
+                <a:latin typeface="Verdana"/>
+                <a:ea typeface="Verdana"/>
+                <a:cs typeface="Verdana"/>
+                <a:sym typeface="Verdana"/>
+              </a:rPr>
+              <a:t>Reviewer: </a:t>
+            </a:r>
+            <a:r>
+              <a:rPr lang="en-US" sz="1600" b="1" dirty="0" smtClean="0">
+                <a:latin typeface="Verdana"/>
+                <a:ea typeface="Verdana"/>
+                <a:cs typeface="Verdana"/>
+                <a:sym typeface="Verdana"/>
+              </a:rPr>
+              <a:t>	dr hab. inż. Mariusz Giergiel, prof. AGH</a:t>
+            </a:r>
+          </a:p>
+          <a:p>
+            <a:pPr lvl="0" algn="r"/>
+            <a:r>
+              <a:rPr lang="en-US" sz="1600" b="1" dirty="0" smtClean="0">
+                <a:solidFill>
+                  <a:srgbClr val="000000"/>
+                </a:solidFill>
+                <a:latin typeface="Verdana"/>
+                <a:ea typeface="Verdana"/>
+                <a:cs typeface="Verdana"/>
+                <a:sym typeface="Verdana"/>
+              </a:rPr>
+              <a:t>	</a:t>
+            </a:r>
+            <a:endParaRPr lang="en-US" dirty="0"/>
           </a:p>
         </p:txBody>
       </p:sp>
@@ -5863,7 +6167,6 @@
               <a:rPr lang="en-US" sz="2400" dirty="0"/>
               <a:t>How does the CI tool work?</a:t>
             </a:r>
-            <a:endParaRPr lang="en-US" sz="2400" dirty="0"/>
           </a:p>
         </p:txBody>
       </p:sp>
@@ -6080,7 +6383,6 @@
               <a:rPr lang="en-US" sz="2400" dirty="0"/>
               <a:t>How does the CI tool work?</a:t>
             </a:r>
-            <a:endParaRPr lang="en-US" sz="2400" dirty="0"/>
           </a:p>
         </p:txBody>
       </p:sp>
@@ -6302,9 +6604,16 @@
           <a:p>
             <a:r>
               <a:rPr lang="en-US" sz="2400" dirty="0"/>
-              <a:t>How does the CI tool work?</a:t>
-            </a:r>
-            <a:endParaRPr lang="en-US" sz="2400" dirty="0"/>
+              <a:t>How does the </a:t>
+            </a:r>
+            <a:r>
+              <a:rPr lang="en-US" sz="2400" dirty="0" smtClean="0"/>
+              <a:t>CI </a:t>
+            </a:r>
+            <a:r>
+              <a:rPr lang="en-US" sz="2400" dirty="0"/>
+              <a:t>tool work?</a:t>
+            </a:r>
           </a:p>
         </p:txBody>
       </p:sp>
@@ -6713,10 +7022,10 @@
           <a:lstStyle/>
           <a:p>
             <a:r>
-              <a:rPr lang="en-GB" sz="2800" dirty="0" smtClean="0"/>
-              <a:t>Literature review</a:t>
-            </a:r>
-            <a:endParaRPr lang="en-GB" sz="2800" dirty="0"/>
+              <a:rPr lang="en-US" sz="2400" dirty="0" smtClean="0"/>
+              <a:t>The general principles of CI</a:t>
+            </a:r>
+            <a:endParaRPr lang="en-US" sz="2300" dirty="0"/>
           </a:p>
         </p:txBody>
       </p:sp>
@@ -6732,8 +7041,8 @@
         </p:nvSpPr>
         <p:spPr>
           <a:xfrm>
-            <a:off x="551145" y="1628775"/>
-            <a:ext cx="8135655" cy="4497388"/>
+            <a:off x="513567" y="1501863"/>
+            <a:ext cx="8229600" cy="5010020"/>
           </a:xfrm>
         </p:spPr>
         <p:txBody>
@@ -6741,88 +7050,203 @@
           <a:lstStyle/>
           <a:p>
             <a:pPr marL="0" indent="0" algn="just">
+              <a:lnSpc>
+                <a:spcPct val="150000"/>
+              </a:lnSpc>
               <a:buNone/>
             </a:pPr>
-            <a:endParaRPr lang="pl-PL" dirty="0"/>
-          </a:p>
-          <a:p>
-            <a:pPr marL="0" indent="0">
+            <a:r>
+              <a:rPr lang="pl-PL" sz="1500" dirty="0" smtClean="0"/>
+              <a:t>In </a:t>
+            </a:r>
+            <a:r>
+              <a:rPr lang="en-US" sz="1500" dirty="0" smtClean="0"/>
+              <a:t>order to summarize</a:t>
+            </a:r>
+            <a:r>
+              <a:rPr lang="pl-PL" sz="1500" dirty="0" smtClean="0"/>
+              <a:t> </a:t>
+            </a:r>
+            <a:r>
+              <a:rPr lang="en-US" sz="1500" dirty="0" smtClean="0"/>
+              <a:t>the material covered by the scope of the thesis there should be a retrospective look at the general principles of the CI process</a:t>
+            </a:r>
+            <a:r>
+              <a:rPr lang="pl-PL" sz="1500" dirty="0"/>
+              <a:t> </a:t>
+            </a:r>
+            <a:r>
+              <a:rPr lang="en-US" sz="1500" dirty="0" smtClean="0"/>
+              <a:t>made</a:t>
+            </a:r>
+            <a:r>
+              <a:rPr lang="pl-PL" sz="1500" dirty="0" smtClean="0"/>
+              <a:t>:</a:t>
+            </a:r>
+          </a:p>
+          <a:p>
+            <a:pPr lvl="1" algn="just">
+              <a:lnSpc>
+                <a:spcPct val="150000"/>
+              </a:lnSpc>
+              <a:buFont typeface="Arial" panose="020B0604020202020204" pitchFamily="34" charset="0"/>
+              <a:buChar char="•"/>
+            </a:pPr>
+            <a:r>
+              <a:rPr lang="en-US" sz="1500" dirty="0" smtClean="0"/>
+              <a:t>Maintain </a:t>
+            </a:r>
+            <a:r>
+              <a:rPr lang="en-US" sz="1500" dirty="0"/>
+              <a:t>a code </a:t>
+            </a:r>
+            <a:r>
+              <a:rPr lang="en-US" sz="1500" dirty="0" smtClean="0"/>
+              <a:t>repository</a:t>
+            </a:r>
+            <a:r>
+              <a:rPr lang="pl-PL" sz="1500" dirty="0" smtClean="0"/>
+              <a:t>,</a:t>
+            </a:r>
+          </a:p>
+          <a:p>
+            <a:pPr lvl="1" algn="just">
+              <a:lnSpc>
+                <a:spcPct val="150000"/>
+              </a:lnSpc>
+              <a:buFont typeface="Arial" panose="020B0604020202020204" pitchFamily="34" charset="0"/>
+              <a:buChar char="•"/>
+            </a:pPr>
+            <a:r>
+              <a:rPr lang="en-US" sz="1500" dirty="0" smtClean="0"/>
+              <a:t>Automate </a:t>
+            </a:r>
+            <a:r>
+              <a:rPr lang="en-US" sz="1500" dirty="0"/>
+              <a:t>the </a:t>
+            </a:r>
+            <a:r>
+              <a:rPr lang="en-US" sz="1500" dirty="0" smtClean="0"/>
+              <a:t>build</a:t>
+            </a:r>
+            <a:r>
+              <a:rPr lang="pl-PL" sz="1500" dirty="0"/>
+              <a:t>,</a:t>
+            </a:r>
+            <a:endParaRPr lang="en-US" sz="1500" dirty="0" smtClean="0"/>
+          </a:p>
+          <a:p>
+            <a:pPr lvl="1" algn="just">
+              <a:lnSpc>
+                <a:spcPct val="150000"/>
+              </a:lnSpc>
+              <a:buFont typeface="Arial" panose="020B0604020202020204" pitchFamily="34" charset="0"/>
+              <a:buChar char="•"/>
+            </a:pPr>
+            <a:r>
+              <a:rPr lang="en-US" sz="1500" dirty="0" smtClean="0"/>
+              <a:t>Make the build self-testing,</a:t>
+            </a:r>
+          </a:p>
+          <a:p>
+            <a:pPr lvl="1" algn="just">
+              <a:lnSpc>
+                <a:spcPct val="150000"/>
+              </a:lnSpc>
+              <a:buFont typeface="Arial" panose="020B0604020202020204" pitchFamily="34" charset="0"/>
+              <a:buChar char="•"/>
+            </a:pPr>
+            <a:r>
+              <a:rPr lang="en-US" sz="1500" dirty="0" smtClean="0"/>
+              <a:t>Every commit should be built on an integration machine,</a:t>
+            </a:r>
+          </a:p>
+          <a:p>
+            <a:pPr lvl="1" algn="just">
+              <a:lnSpc>
+                <a:spcPct val="150000"/>
+              </a:lnSpc>
+              <a:buFont typeface="Arial" panose="020B0604020202020204" pitchFamily="34" charset="0"/>
+              <a:buChar char="•"/>
+            </a:pPr>
+            <a:r>
+              <a:rPr lang="en-US" sz="1500" dirty="0" smtClean="0"/>
+              <a:t>Keep the build fast,</a:t>
+            </a:r>
+          </a:p>
+          <a:p>
+            <a:pPr lvl="1" algn="just">
+              <a:lnSpc>
+                <a:spcPct val="150000"/>
+              </a:lnSpc>
+              <a:buFont typeface="Arial" panose="020B0604020202020204" pitchFamily="34" charset="0"/>
+              <a:buChar char="•"/>
+            </a:pPr>
+            <a:r>
+              <a:rPr lang="en-US" sz="1500" dirty="0" smtClean="0"/>
+              <a:t>Test in a clone of the production environment,</a:t>
+            </a:r>
+          </a:p>
+          <a:p>
+            <a:pPr lvl="1" algn="just">
+              <a:lnSpc>
+                <a:spcPct val="150000"/>
+              </a:lnSpc>
+              <a:buFont typeface="Arial" panose="020B0604020202020204" pitchFamily="34" charset="0"/>
+              <a:buChar char="•"/>
+            </a:pPr>
+            <a:r>
+              <a:rPr lang="en-US" sz="1500" dirty="0" smtClean="0"/>
+              <a:t>Make it easy for anyone to get the latest executable version,</a:t>
+            </a:r>
+          </a:p>
+          <a:p>
+            <a:pPr lvl="1" algn="just">
+              <a:lnSpc>
+                <a:spcPct val="150000"/>
+              </a:lnSpc>
+              <a:buFont typeface="Arial" panose="020B0604020202020204" pitchFamily="34" charset="0"/>
+              <a:buChar char="•"/>
+            </a:pPr>
+            <a:r>
+              <a:rPr lang="en-US" sz="1500" dirty="0" smtClean="0"/>
+              <a:t>Everyone can see the results of the latest build,</a:t>
+            </a:r>
+          </a:p>
+          <a:p>
+            <a:pPr lvl="1" algn="just">
+              <a:lnSpc>
+                <a:spcPct val="150000"/>
+              </a:lnSpc>
+              <a:buFont typeface="Arial" panose="020B0604020202020204" pitchFamily="34" charset="0"/>
+              <a:buChar char="•"/>
+            </a:pPr>
+            <a:r>
+              <a:rPr lang="en-US" sz="1500" dirty="0" smtClean="0"/>
+              <a:t>Automate deployment.</a:t>
+            </a:r>
+            <a:endParaRPr lang="en-US" sz="1300" dirty="0" smtClean="0"/>
+          </a:p>
+          <a:p>
+            <a:pPr marL="0" indent="0" algn="just">
+              <a:lnSpc>
+                <a:spcPct val="150000"/>
+              </a:lnSpc>
               <a:buNone/>
             </a:pPr>
             <a:r>
-              <a:rPr lang="en-GB" dirty="0" smtClean="0"/>
-              <a:t>[1]  -  NI-CAN Hardware and Software Manual</a:t>
-            </a:r>
-          </a:p>
-          <a:p>
-            <a:pPr marL="0" indent="0">
-              <a:buNone/>
-            </a:pPr>
-            <a:r>
-              <a:rPr lang="en-GB" dirty="0" smtClean="0"/>
-              <a:t>[2]  -  </a:t>
-            </a:r>
-            <a:r>
-              <a:rPr lang="en-GB" dirty="0" err="1" smtClean="0"/>
-              <a:t>CiA</a:t>
-            </a:r>
-            <a:r>
-              <a:rPr lang="en-GB" dirty="0" smtClean="0"/>
-              <a:t> Draft Standard 301 – CANopen 	 	 Application Layer and Communication Profile</a:t>
-            </a:r>
-          </a:p>
-          <a:p>
-            <a:pPr marL="0" indent="0">
-              <a:buNone/>
-            </a:pPr>
-            <a:r>
-              <a:rPr lang="en-GB" dirty="0" smtClean="0"/>
-              <a:t>[3]  -  </a:t>
-            </a:r>
-            <a:r>
-              <a:rPr lang="en-GB" dirty="0" err="1" smtClean="0"/>
-              <a:t>CiA</a:t>
-            </a:r>
-            <a:r>
-              <a:rPr lang="en-GB" dirty="0" smtClean="0"/>
-              <a:t> Draft Standard 401 – CANopen Device 	 profile for generic I /O modules</a:t>
-            </a:r>
-          </a:p>
-          <a:p>
-            <a:pPr marL="0" indent="0">
-              <a:buNone/>
-            </a:pPr>
-            <a:r>
-              <a:rPr lang="en-GB" dirty="0" smtClean="0"/>
-              <a:t>[4]  -  http://www.ni.com/en-gb.html</a:t>
-            </a:r>
-          </a:p>
-          <a:p>
-            <a:pPr marL="0" indent="0">
-              <a:buNone/>
-            </a:pPr>
-            <a:r>
-              <a:rPr lang="en-GB" dirty="0" smtClean="0"/>
-              <a:t>[5]  -  http://www.woodward.com/</a:t>
-            </a:r>
-          </a:p>
-          <a:p>
-            <a:pPr marL="0" indent="0">
-              <a:buNone/>
-            </a:pPr>
-            <a:r>
-              <a:rPr lang="en-GB" dirty="0" smtClean="0"/>
-              <a:t>[6]  -  Woodward’s brochure</a:t>
-            </a:r>
-            <a:r>
-              <a:rPr lang="pl-PL" dirty="0" smtClean="0"/>
-              <a:t>:</a:t>
-            </a:r>
-            <a:r>
-              <a:rPr lang="en-GB" dirty="0" smtClean="0"/>
-              <a:t> 505 &amp; 505-XT 	 	 controllers for industrial steam turbines</a:t>
-            </a:r>
-            <a:endParaRPr lang="en-GB" dirty="0"/>
+              <a:rPr lang="en-US" sz="1500" dirty="0" smtClean="0"/>
+              <a:t>The above list was mentioned once again on this slide for the purpose of illustrating that </a:t>
+            </a:r>
+            <a:r>
+              <a:rPr lang="en-US" sz="1500" b="1" dirty="0" smtClean="0"/>
+              <a:t>the CI tool successfully uses each of the principles</a:t>
+            </a:r>
+            <a:r>
+              <a:rPr lang="en-US" sz="1500" dirty="0" smtClean="0"/>
+              <a:t>. </a:t>
+            </a:r>
+            <a:endParaRPr lang="en-US" sz="1500" dirty="0" smtClean="0"/>
           </a:p>
         </p:txBody>
       </p:sp>
@@ -6858,7 +7282,1356 @@
     </p:spTree>
     <p:extLst>
       <p:ext uri="{BB962C8B-B14F-4D97-AF65-F5344CB8AC3E}">
+        <p14:creationId xmlns:p14="http://schemas.microsoft.com/office/powerpoint/2010/main" val="123237202"/>
+      </p:ext>
+    </p:extLst>
+  </p:cSld>
+  <p:clrMapOvr>
+    <a:masterClrMapping/>
+  </p:clrMapOvr>
+</p:sld>
+</file>
+
+<file path=ppt/slides/slide14.xml><?xml version="1.0" encoding="utf-8"?>
+<p:sld xmlns:a="http://schemas.openxmlformats.org/drawingml/2006/main" xmlns:r="http://schemas.openxmlformats.org/officeDocument/2006/relationships" xmlns:p="http://schemas.openxmlformats.org/presentationml/2006/main">
+  <p:cSld>
+    <p:spTree>
+      <p:nvGrpSpPr>
+        <p:cNvPr id="1" name=""/>
+        <p:cNvGrpSpPr/>
+        <p:nvPr/>
+      </p:nvGrpSpPr>
+      <p:grpSpPr>
+        <a:xfrm>
+          <a:off x="0" y="0"/>
+          <a:ext cx="0" cy="0"/>
+          <a:chOff x="0" y="0"/>
+          <a:chExt cx="0" cy="0"/>
+        </a:xfrm>
+      </p:grpSpPr>
+      <p:sp>
+        <p:nvSpPr>
+          <p:cNvPr id="2" name="Tytuł 1"/>
+          <p:cNvSpPr>
+            <a:spLocks noGrp="1"/>
+          </p:cNvSpPr>
+          <p:nvPr>
+            <p:ph type="title"/>
+          </p:nvPr>
+        </p:nvSpPr>
+        <p:spPr/>
+        <p:txBody>
+          <a:bodyPr/>
+          <a:lstStyle/>
+          <a:p>
+            <a:r>
+              <a:rPr lang="pl-PL" sz="2400" dirty="0" smtClean="0"/>
+              <a:t>T</a:t>
+            </a:r>
+            <a:r>
+              <a:rPr lang="en-US" sz="2400" dirty="0" smtClean="0"/>
+              <a:t>he </a:t>
+            </a:r>
+            <a:r>
+              <a:rPr lang="en-US" sz="2400" dirty="0"/>
+              <a:t>benefits of </a:t>
+            </a:r>
+            <a:r>
+              <a:rPr lang="pl-PL" sz="2400" dirty="0" smtClean="0"/>
+              <a:t>CI</a:t>
+            </a:r>
+            <a:endParaRPr lang="en-US" sz="2400" dirty="0"/>
+          </a:p>
+        </p:txBody>
+      </p:sp>
+      <p:sp>
+        <p:nvSpPr>
+          <p:cNvPr id="6" name="Symbol zastępczy numeru slajdu 5"/>
+          <p:cNvSpPr>
+            <a:spLocks noGrp="1"/>
+          </p:cNvSpPr>
+          <p:nvPr>
+            <p:ph type="sldNum" sz="quarter" idx="12"/>
+          </p:nvPr>
+        </p:nvSpPr>
+        <p:spPr/>
+        <p:txBody>
+          <a:bodyPr/>
+          <a:lstStyle/>
+          <a:p>
+            <a:pPr>
+              <a:defRPr/>
+            </a:pPr>
+            <a:fld id="{A62F389E-D7CB-4405-90CE-93B848A33135}" type="slidenum">
+              <a:rPr lang="pl-PL" smtClean="0"/>
+              <a:pPr>
+                <a:defRPr/>
+              </a:pPr>
+              <a:t>14</a:t>
+            </a:fld>
+            <a:endParaRPr lang="pl-PL" dirty="0"/>
+          </a:p>
+        </p:txBody>
+      </p:sp>
+      <p:sp>
+        <p:nvSpPr>
+          <p:cNvPr id="4" name="Prostokąt 3"/>
+          <p:cNvSpPr/>
+          <p:nvPr/>
+        </p:nvSpPr>
+        <p:spPr>
+          <a:xfrm>
+            <a:off x="435074" y="1571937"/>
+            <a:ext cx="8536398" cy="4939814"/>
+          </a:xfrm>
+          <a:prstGeom prst="rect">
+            <a:avLst/>
+          </a:prstGeom>
+        </p:spPr>
+        <p:txBody>
+          <a:bodyPr wrap="square">
+            <a:spAutoFit/>
+          </a:bodyPr>
+          <a:lstStyle/>
+          <a:p>
+            <a:pPr lvl="0"/>
+            <a:r>
+              <a:rPr lang="en-US" sz="1500" dirty="0" smtClean="0"/>
+              <a:t>The proposed CI tool besides the general advantages of adopting the CI principles</a:t>
+            </a:r>
+            <a:r>
+              <a:rPr lang="pl-PL" sz="1500" dirty="0" smtClean="0"/>
+              <a:t> [3]:</a:t>
+            </a:r>
+            <a:endParaRPr lang="en-US" sz="1500" dirty="0" smtClean="0"/>
+          </a:p>
+          <a:p>
+            <a:pPr marL="742950" lvl="1" indent="-285750">
+              <a:lnSpc>
+                <a:spcPct val="150000"/>
+              </a:lnSpc>
+              <a:buFont typeface="Arial" panose="020B0604020202020204" pitchFamily="34" charset="0"/>
+              <a:buChar char="•"/>
+            </a:pPr>
+            <a:r>
+              <a:rPr lang="en-US" sz="1500" dirty="0" smtClean="0"/>
+              <a:t>Immediate feedback on software quality,</a:t>
+            </a:r>
+          </a:p>
+          <a:p>
+            <a:pPr marL="742950" lvl="1" indent="-285750">
+              <a:lnSpc>
+                <a:spcPct val="150000"/>
+              </a:lnSpc>
+              <a:buFont typeface="Arial" panose="020B0604020202020204" pitchFamily="34" charset="0"/>
+              <a:buChar char="•"/>
+            </a:pPr>
+            <a:r>
+              <a:rPr lang="en-US" sz="1500" dirty="0" smtClean="0"/>
+              <a:t>Prevent</a:t>
+            </a:r>
+            <a:r>
+              <a:rPr lang="pl-PL" sz="1500" dirty="0" smtClean="0"/>
+              <a:t>s</a:t>
+            </a:r>
+            <a:r>
+              <a:rPr lang="en-US" sz="1500" dirty="0" smtClean="0"/>
+              <a:t> integration problems, </a:t>
+            </a:r>
+            <a:r>
+              <a:rPr lang="pl-PL" sz="1500" dirty="0" smtClean="0"/>
+              <a:t>a</a:t>
+            </a:r>
+            <a:r>
+              <a:rPr lang="en-US" sz="1500" dirty="0" smtClean="0"/>
+              <a:t>voids last-minute chaos at release dates,</a:t>
+            </a:r>
+          </a:p>
+          <a:p>
+            <a:pPr marL="742950" lvl="1" indent="-285750">
+              <a:lnSpc>
+                <a:spcPct val="150000"/>
+              </a:lnSpc>
+              <a:buFont typeface="Arial" panose="020B0604020202020204" pitchFamily="34" charset="0"/>
+              <a:buChar char="•"/>
+            </a:pPr>
+            <a:r>
+              <a:rPr lang="en-US" sz="1500" dirty="0" smtClean="0"/>
+              <a:t>Repeatable build process,</a:t>
+            </a:r>
+          </a:p>
+          <a:p>
+            <a:pPr marL="742950" lvl="1" indent="-285750">
+              <a:lnSpc>
+                <a:spcPct val="150000"/>
+              </a:lnSpc>
+              <a:buFont typeface="Arial" panose="020B0604020202020204" pitchFamily="34" charset="0"/>
+              <a:buChar char="•"/>
+            </a:pPr>
+            <a:r>
+              <a:rPr lang="en-US" sz="1500" dirty="0" smtClean="0"/>
+              <a:t>Constant availability of a “current” build for testing, demo, or release purposes,</a:t>
+            </a:r>
+          </a:p>
+          <a:p>
+            <a:pPr marL="742950" lvl="1" indent="-285750">
+              <a:lnSpc>
+                <a:spcPct val="150000"/>
+              </a:lnSpc>
+              <a:buFont typeface="Arial" panose="020B0604020202020204" pitchFamily="34" charset="0"/>
+              <a:buChar char="•"/>
+            </a:pPr>
+            <a:r>
+              <a:rPr lang="en-US" sz="1500" dirty="0" smtClean="0"/>
+              <a:t>Automated testing: code is tested in the same way for every change,</a:t>
+            </a:r>
+          </a:p>
+          <a:p>
+            <a:pPr marL="742950" lvl="1" indent="-285750">
+              <a:lnSpc>
+                <a:spcPct val="150000"/>
+              </a:lnSpc>
+              <a:buFont typeface="Arial" panose="020B0604020202020204" pitchFamily="34" charset="0"/>
+              <a:buChar char="•"/>
+            </a:pPr>
+            <a:r>
+              <a:rPr lang="en-US" sz="1500" dirty="0" smtClean="0"/>
+              <a:t>Increase</a:t>
+            </a:r>
+            <a:r>
+              <a:rPr lang="pl-PL" sz="1500" dirty="0" smtClean="0"/>
+              <a:t>s</a:t>
+            </a:r>
+            <a:r>
+              <a:rPr lang="en-US" sz="1500" dirty="0" smtClean="0"/>
+              <a:t> visibility which enables greater communication,</a:t>
+            </a:r>
+          </a:p>
+          <a:p>
+            <a:pPr marL="742950" lvl="1" indent="-285750">
+              <a:lnSpc>
+                <a:spcPct val="150000"/>
+              </a:lnSpc>
+              <a:buFont typeface="Arial" panose="020B0604020202020204" pitchFamily="34" charset="0"/>
+              <a:buChar char="•"/>
+            </a:pPr>
+            <a:r>
+              <a:rPr lang="en-US" sz="1500" dirty="0" smtClean="0"/>
+              <a:t>Spend</a:t>
+            </a:r>
+            <a:r>
+              <a:rPr lang="pl-PL" sz="1500" dirty="0" smtClean="0"/>
+              <a:t>s</a:t>
+            </a:r>
+            <a:r>
+              <a:rPr lang="en-US" sz="1500" dirty="0" smtClean="0"/>
+              <a:t> less time debugging and more time adding features,</a:t>
+            </a:r>
+          </a:p>
+          <a:p>
+            <a:pPr marL="742950" lvl="1" indent="-285750">
+              <a:lnSpc>
+                <a:spcPct val="150000"/>
+              </a:lnSpc>
+              <a:buFont typeface="Arial" panose="020B0604020202020204" pitchFamily="34" charset="0"/>
+              <a:buChar char="•"/>
+            </a:pPr>
+            <a:r>
+              <a:rPr lang="en-US" sz="1500" dirty="0" smtClean="0"/>
+              <a:t>Helps break down the barriers between developers, tester</a:t>
+            </a:r>
+            <a:r>
+              <a:rPr lang="pl-PL" sz="1500" dirty="0" smtClean="0"/>
+              <a:t>s</a:t>
+            </a:r>
+            <a:r>
+              <a:rPr lang="en-US" sz="1500" dirty="0" smtClean="0"/>
+              <a:t> and customer,</a:t>
+            </a:r>
+          </a:p>
+          <a:p>
+            <a:pPr marL="742950" lvl="1" indent="-285750">
+              <a:lnSpc>
+                <a:spcPct val="150000"/>
+              </a:lnSpc>
+              <a:buFont typeface="Arial" panose="020B0604020202020204" pitchFamily="34" charset="0"/>
+              <a:buChar char="•"/>
+            </a:pPr>
+            <a:r>
+              <a:rPr lang="en-US" sz="1500" dirty="0" smtClean="0"/>
+              <a:t>Ease of tracking all of the changes, possibility to revert the code to stable version,</a:t>
+            </a:r>
+          </a:p>
+          <a:p>
+            <a:pPr lvl="0"/>
+            <a:r>
+              <a:rPr lang="en-US" sz="1500" dirty="0" smtClean="0"/>
+              <a:t>places additional emphasis on:</a:t>
+            </a:r>
+          </a:p>
+          <a:p>
+            <a:pPr marL="742950" lvl="1" indent="-285750">
+              <a:lnSpc>
+                <a:spcPct val="150000"/>
+              </a:lnSpc>
+              <a:buFont typeface="Arial" panose="020B0604020202020204" pitchFamily="34" charset="0"/>
+              <a:buChar char="•"/>
+            </a:pPr>
+            <a:r>
+              <a:rPr lang="en-US" sz="1500" b="1" dirty="0" smtClean="0"/>
+              <a:t>Measuring system-wide impact of local changes.</a:t>
+            </a:r>
+          </a:p>
+          <a:p>
+            <a:pPr lvl="0"/>
+            <a:endParaRPr lang="en-US" sz="1500" dirty="0"/>
+          </a:p>
+        </p:txBody>
+      </p:sp>
+    </p:spTree>
+    <p:extLst>
+      <p:ext uri="{BB962C8B-B14F-4D97-AF65-F5344CB8AC3E}">
+        <p14:creationId xmlns:p14="http://schemas.microsoft.com/office/powerpoint/2010/main" val="59526593"/>
+      </p:ext>
+    </p:extLst>
+  </p:cSld>
+  <p:clrMapOvr>
+    <a:masterClrMapping/>
+  </p:clrMapOvr>
+</p:sld>
+</file>
+
+<file path=ppt/slides/slide15.xml><?xml version="1.0" encoding="utf-8"?>
+<p:sld xmlns:a="http://schemas.openxmlformats.org/drawingml/2006/main" xmlns:r="http://schemas.openxmlformats.org/officeDocument/2006/relationships" xmlns:p="http://schemas.openxmlformats.org/presentationml/2006/main">
+  <p:cSld>
+    <p:spTree>
+      <p:nvGrpSpPr>
+        <p:cNvPr id="1" name=""/>
+        <p:cNvGrpSpPr/>
+        <p:nvPr/>
+      </p:nvGrpSpPr>
+      <p:grpSpPr>
+        <a:xfrm>
+          <a:off x="0" y="0"/>
+          <a:ext cx="0" cy="0"/>
+          <a:chOff x="0" y="0"/>
+          <a:chExt cx="0" cy="0"/>
+        </a:xfrm>
+      </p:grpSpPr>
+      <p:sp>
+        <p:nvSpPr>
+          <p:cNvPr id="2" name="Tytuł 1"/>
+          <p:cNvSpPr>
+            <a:spLocks noGrp="1"/>
+          </p:cNvSpPr>
+          <p:nvPr>
+            <p:ph type="title"/>
+          </p:nvPr>
+        </p:nvSpPr>
+        <p:spPr>
+          <a:xfrm>
+            <a:off x="1547813" y="476250"/>
+            <a:ext cx="7268383" cy="941388"/>
+          </a:xfrm>
+        </p:spPr>
+        <p:txBody>
+          <a:bodyPr/>
+          <a:lstStyle/>
+          <a:p>
+            <a:r>
+              <a:rPr lang="en-US" sz="2800" dirty="0" smtClean="0"/>
+              <a:t>Possibility for further improvement</a:t>
+            </a:r>
+            <a:endParaRPr lang="en-US" sz="2800" dirty="0"/>
+          </a:p>
+        </p:txBody>
+      </p:sp>
+      <p:sp>
+        <p:nvSpPr>
+          <p:cNvPr id="6" name="Symbol zastępczy numeru slajdu 5"/>
+          <p:cNvSpPr>
+            <a:spLocks noGrp="1"/>
+          </p:cNvSpPr>
+          <p:nvPr>
+            <p:ph type="sldNum" sz="quarter" idx="12"/>
+          </p:nvPr>
+        </p:nvSpPr>
+        <p:spPr/>
+        <p:txBody>
+          <a:bodyPr/>
+          <a:lstStyle/>
+          <a:p>
+            <a:pPr>
+              <a:defRPr/>
+            </a:pPr>
+            <a:fld id="{A62F389E-D7CB-4405-90CE-93B848A33135}" type="slidenum">
+              <a:rPr lang="pl-PL" smtClean="0"/>
+              <a:pPr>
+                <a:defRPr/>
+              </a:pPr>
+              <a:t>15</a:t>
+            </a:fld>
+            <a:endParaRPr lang="pl-PL" dirty="0"/>
+          </a:p>
+        </p:txBody>
+      </p:sp>
+      <p:sp>
+        <p:nvSpPr>
+          <p:cNvPr id="4" name="Rectangle 2"/>
+          <p:cNvSpPr>
+            <a:spLocks noChangeArrowheads="1"/>
+          </p:cNvSpPr>
+          <p:nvPr/>
+        </p:nvSpPr>
+        <p:spPr bwMode="auto">
+          <a:xfrm>
+            <a:off x="1547813" y="1570008"/>
+            <a:ext cx="9144000" cy="0"/>
+          </a:xfrm>
+          <a:prstGeom prst="rect">
+            <a:avLst/>
+          </a:prstGeom>
+          <a:noFill/>
+          <a:ln>
+            <a:noFill/>
+          </a:ln>
+          <a:effectLst/>
+          <a:extLst>
+            <a:ext uri="{909E8E84-426E-40DD-AFC4-6F175D3DCCD1}">
+              <a14:hiddenFill xmlns:a14="http://schemas.microsoft.com/office/drawing/2010/main">
+                <a:solidFill>
+                  <a:schemeClr val="accent1"/>
+                </a:solidFill>
+              </a14:hiddenFill>
+            </a:ext>
+            <a:ext uri="{91240B29-F687-4F45-9708-019B960494DF}">
+              <a14:hiddenLine xmlns:a14="http://schemas.microsoft.com/office/drawing/2010/main" w="9525">
+                <a:solidFill>
+                  <a:schemeClr val="tx1"/>
+                </a:solidFill>
+                <a:miter lim="800000"/>
+                <a:headEnd/>
+                <a:tailEnd/>
+              </a14:hiddenLine>
+            </a:ext>
+            <a:ext uri="{AF507438-7753-43E0-B8FC-AC1667EBCBE1}">
+              <a14:hiddenEffects xmlns:a14="http://schemas.microsoft.com/office/drawing/2010/main">
+                <a:effectLst>
+                  <a:outerShdw dist="35921" dir="2700000" algn="ctr" rotWithShape="0">
+                    <a:schemeClr val="bg2"/>
+                  </a:outerShdw>
+                </a:effectLst>
+              </a14:hiddenEffects>
+            </a:ext>
+          </a:extLst>
+        </p:spPr>
+        <p:txBody>
+          <a:bodyPr vert="horz" wrap="none" lIns="91440" tIns="45720" rIns="91440" bIns="45720" numCol="1" anchor="ctr" anchorCtr="0" compatLnSpc="1">
+            <a:prstTxWarp prst="textNoShape">
+              <a:avLst/>
+            </a:prstTxWarp>
+            <a:spAutoFit/>
+          </a:bodyPr>
+          <a:lstStyle/>
+          <a:p>
+            <a:endParaRPr lang="en-US"/>
+          </a:p>
+        </p:txBody>
+      </p:sp>
+      <p:graphicFrame>
+        <p:nvGraphicFramePr>
+          <p:cNvPr id="5" name="Object 4"/>
+          <p:cNvGraphicFramePr>
+            <a:graphicFrameLocks noChangeAspect="1"/>
+          </p:cNvGraphicFramePr>
+          <p:nvPr>
+            <p:extLst>
+              <p:ext uri="{D42A27DB-BD31-4B8C-83A1-F6EECF244321}">
+                <p14:modId xmlns:p14="http://schemas.microsoft.com/office/powerpoint/2010/main" val="3275169406"/>
+              </p:ext>
+            </p:extLst>
+          </p:nvPr>
+        </p:nvGraphicFramePr>
+        <p:xfrm>
+          <a:off x="1820861" y="1570008"/>
+          <a:ext cx="5502275" cy="4541838"/>
+        </p:xfrm>
+        <a:graphic>
+          <a:graphicData uri="http://schemas.openxmlformats.org/presentationml/2006/ole">
+            <mc:AlternateContent xmlns:mc="http://schemas.openxmlformats.org/markup-compatibility/2006">
+              <mc:Choice xmlns:v="urn:schemas-microsoft-com:vml" Requires="v">
+                <p:oleObj spid="_x0000_s1031" r:id="rId3" imgW="10315643" imgH="8534490" progId="Visio.Drawing.15">
+                  <p:embed/>
+                </p:oleObj>
+              </mc:Choice>
+              <mc:Fallback>
+                <p:oleObj r:id="rId3" imgW="10315643" imgH="8534490" progId="Visio.Drawing.15">
+                  <p:embed/>
+                  <p:pic>
+                    <p:nvPicPr>
+                      <p:cNvPr id="0" name="Object 1"/>
+                      <p:cNvPicPr>
+                        <a:picLocks noChangeAspect="1" noChangeArrowheads="1"/>
+                      </p:cNvPicPr>
+                      <p:nvPr/>
+                    </p:nvPicPr>
+                    <p:blipFill>
+                      <a:blip r:embed="rId4">
+                        <a:extLst>
+                          <a:ext uri="{28A0092B-C50C-407E-A947-70E740481C1C}">
+                            <a14:useLocalDpi xmlns:a14="http://schemas.microsoft.com/office/drawing/2010/main" val="0"/>
+                          </a:ext>
+                        </a:extLst>
+                      </a:blip>
+                      <a:srcRect/>
+                      <a:stretch>
+                        <a:fillRect/>
+                      </a:stretch>
+                    </p:blipFill>
+                    <p:spPr bwMode="auto">
+                      <a:xfrm>
+                        <a:off x="1820861" y="1570008"/>
+                        <a:ext cx="5502275" cy="4541838"/>
+                      </a:xfrm>
+                      <a:prstGeom prst="rect">
+                        <a:avLst/>
+                      </a:prstGeom>
+                      <a:noFill/>
+                      <a:extLst>
+                        <a:ext uri="{909E8E84-426E-40DD-AFC4-6F175D3DCCD1}">
+                          <a14:hiddenFill xmlns:a14="http://schemas.microsoft.com/office/drawing/2010/main">
+                            <a:solidFill>
+                              <a:srgbClr val="FFFFFF"/>
+                            </a:solidFill>
+                          </a14:hiddenFill>
+                        </a:ext>
+                      </a:extLst>
+                    </p:spPr>
+                  </p:pic>
+                </p:oleObj>
+              </mc:Fallback>
+            </mc:AlternateContent>
+          </a:graphicData>
+        </a:graphic>
+      </p:graphicFrame>
+      <p:sp>
+        <p:nvSpPr>
+          <p:cNvPr id="8" name="pole tekstowe 7"/>
+          <p:cNvSpPr txBox="1"/>
+          <p:nvPr/>
+        </p:nvSpPr>
+        <p:spPr>
+          <a:xfrm>
+            <a:off x="673835" y="6111846"/>
+            <a:ext cx="7796329" cy="523220"/>
+          </a:xfrm>
+          <a:prstGeom prst="rect">
+            <a:avLst/>
+          </a:prstGeom>
+          <a:noFill/>
+        </p:spPr>
+        <p:txBody>
+          <a:bodyPr wrap="square" rtlCol="0">
+            <a:spAutoFit/>
+          </a:bodyPr>
+          <a:lstStyle/>
+          <a:p>
+            <a:pPr algn="ctr"/>
+            <a:r>
+              <a:rPr lang="en-US" sz="1400" dirty="0"/>
+              <a:t>Fig. </a:t>
+            </a:r>
+            <a:r>
+              <a:rPr lang="pl-PL" sz="1400" dirty="0" smtClean="0"/>
+              <a:t>10. </a:t>
+            </a:r>
+            <a:r>
+              <a:rPr lang="en-US" sz="1400" dirty="0" smtClean="0"/>
+              <a:t>The </a:t>
+            </a:r>
+            <a:r>
+              <a:rPr lang="en-US" sz="1400" dirty="0"/>
+              <a:t>types of  the software life cycle work products with an indication where the scope of the thesis applies to the software development process.</a:t>
+            </a:r>
+          </a:p>
+        </p:txBody>
+      </p:sp>
+    </p:spTree>
+    <p:extLst>
+      <p:ext uri="{BB962C8B-B14F-4D97-AF65-F5344CB8AC3E}">
         <p14:creationId xmlns:p14="http://schemas.microsoft.com/office/powerpoint/2010/main" val="1196468589"/>
+      </p:ext>
+    </p:extLst>
+  </p:cSld>
+  <p:clrMapOvr>
+    <a:masterClrMapping/>
+  </p:clrMapOvr>
+</p:sld>
+</file>
+
+<file path=ppt/slides/slide16.xml><?xml version="1.0" encoding="utf-8"?>
+<p:sld xmlns:a="http://schemas.openxmlformats.org/drawingml/2006/main" xmlns:r="http://schemas.openxmlformats.org/officeDocument/2006/relationships" xmlns:p="http://schemas.openxmlformats.org/presentationml/2006/main">
+  <p:cSld>
+    <p:spTree>
+      <p:nvGrpSpPr>
+        <p:cNvPr id="1" name=""/>
+        <p:cNvGrpSpPr/>
+        <p:nvPr/>
+      </p:nvGrpSpPr>
+      <p:grpSpPr>
+        <a:xfrm>
+          <a:off x="0" y="0"/>
+          <a:ext cx="0" cy="0"/>
+          <a:chOff x="0" y="0"/>
+          <a:chExt cx="0" cy="0"/>
+        </a:xfrm>
+      </p:grpSpPr>
+      <p:sp>
+        <p:nvSpPr>
+          <p:cNvPr id="2" name="Tytuł 1"/>
+          <p:cNvSpPr>
+            <a:spLocks noGrp="1"/>
+          </p:cNvSpPr>
+          <p:nvPr>
+            <p:ph type="title"/>
+          </p:nvPr>
+        </p:nvSpPr>
+        <p:spPr>
+          <a:xfrm>
+            <a:off x="1547813" y="476250"/>
+            <a:ext cx="7268383" cy="941388"/>
+          </a:xfrm>
+        </p:spPr>
+        <p:txBody>
+          <a:bodyPr/>
+          <a:lstStyle/>
+          <a:p>
+            <a:r>
+              <a:rPr lang="pl-PL" sz="2800" dirty="0" smtClean="0"/>
+              <a:t>A</a:t>
+            </a:r>
+            <a:r>
+              <a:rPr lang="en-US" sz="2800" dirty="0" smtClean="0"/>
+              <a:t>mount </a:t>
+            </a:r>
+            <a:r>
+              <a:rPr lang="en-US" sz="2800" dirty="0"/>
+              <a:t>of work </a:t>
+            </a:r>
+            <a:r>
+              <a:rPr lang="pl-PL" sz="2800" dirty="0" smtClean="0"/>
+              <a:t>for the CI </a:t>
+            </a:r>
+            <a:r>
+              <a:rPr lang="en-US" sz="2800" dirty="0" smtClean="0"/>
+              <a:t>tool</a:t>
+            </a:r>
+            <a:endParaRPr lang="en-US" sz="2800" dirty="0"/>
+          </a:p>
+        </p:txBody>
+      </p:sp>
+      <p:sp>
+        <p:nvSpPr>
+          <p:cNvPr id="6" name="Symbol zastępczy numeru slajdu 5"/>
+          <p:cNvSpPr>
+            <a:spLocks noGrp="1"/>
+          </p:cNvSpPr>
+          <p:nvPr>
+            <p:ph type="sldNum" sz="quarter" idx="12"/>
+          </p:nvPr>
+        </p:nvSpPr>
+        <p:spPr/>
+        <p:txBody>
+          <a:bodyPr/>
+          <a:lstStyle/>
+          <a:p>
+            <a:pPr>
+              <a:defRPr/>
+            </a:pPr>
+            <a:fld id="{A62F389E-D7CB-4405-90CE-93B848A33135}" type="slidenum">
+              <a:rPr lang="pl-PL" smtClean="0"/>
+              <a:pPr>
+                <a:defRPr/>
+              </a:pPr>
+              <a:t>16</a:t>
+            </a:fld>
+            <a:endParaRPr lang="pl-PL" dirty="0"/>
+          </a:p>
+        </p:txBody>
+      </p:sp>
+      <p:sp>
+        <p:nvSpPr>
+          <p:cNvPr id="4" name="Rectangle 2"/>
+          <p:cNvSpPr>
+            <a:spLocks noChangeArrowheads="1"/>
+          </p:cNvSpPr>
+          <p:nvPr/>
+        </p:nvSpPr>
+        <p:spPr bwMode="auto">
+          <a:xfrm>
+            <a:off x="1547813" y="1570008"/>
+            <a:ext cx="9144000" cy="0"/>
+          </a:xfrm>
+          <a:prstGeom prst="rect">
+            <a:avLst/>
+          </a:prstGeom>
+          <a:noFill/>
+          <a:ln>
+            <a:noFill/>
+          </a:ln>
+          <a:effectLst/>
+          <a:extLst>
+            <a:ext uri="{909E8E84-426E-40DD-AFC4-6F175D3DCCD1}">
+              <a14:hiddenFill xmlns:a14="http://schemas.microsoft.com/office/drawing/2010/main">
+                <a:solidFill>
+                  <a:schemeClr val="accent1"/>
+                </a:solidFill>
+              </a14:hiddenFill>
+            </a:ext>
+            <a:ext uri="{91240B29-F687-4F45-9708-019B960494DF}">
+              <a14:hiddenLine xmlns:a14="http://schemas.microsoft.com/office/drawing/2010/main" w="9525">
+                <a:solidFill>
+                  <a:schemeClr val="tx1"/>
+                </a:solidFill>
+                <a:miter lim="800000"/>
+                <a:headEnd/>
+                <a:tailEnd/>
+              </a14:hiddenLine>
+            </a:ext>
+            <a:ext uri="{AF507438-7753-43E0-B8FC-AC1667EBCBE1}">
+              <a14:hiddenEffects xmlns:a14="http://schemas.microsoft.com/office/drawing/2010/main">
+                <a:effectLst>
+                  <a:outerShdw dist="35921" dir="2700000" algn="ctr" rotWithShape="0">
+                    <a:schemeClr val="bg2"/>
+                  </a:outerShdw>
+                </a:effectLst>
+              </a14:hiddenEffects>
+            </a:ext>
+          </a:extLst>
+        </p:spPr>
+        <p:txBody>
+          <a:bodyPr vert="horz" wrap="none" lIns="91440" tIns="45720" rIns="91440" bIns="45720" numCol="1" anchor="ctr" anchorCtr="0" compatLnSpc="1">
+            <a:prstTxWarp prst="textNoShape">
+              <a:avLst/>
+            </a:prstTxWarp>
+            <a:spAutoFit/>
+          </a:bodyPr>
+          <a:lstStyle/>
+          <a:p>
+            <a:endParaRPr lang="en-US"/>
+          </a:p>
+        </p:txBody>
+      </p:sp>
+      <p:sp>
+        <p:nvSpPr>
+          <p:cNvPr id="8" name="pole tekstowe 7"/>
+          <p:cNvSpPr txBox="1"/>
+          <p:nvPr/>
+        </p:nvSpPr>
+        <p:spPr>
+          <a:xfrm>
+            <a:off x="925290" y="5343798"/>
+            <a:ext cx="3215170" cy="523220"/>
+          </a:xfrm>
+          <a:prstGeom prst="rect">
+            <a:avLst/>
+          </a:prstGeom>
+          <a:noFill/>
+        </p:spPr>
+        <p:txBody>
+          <a:bodyPr wrap="square" rtlCol="0">
+            <a:spAutoFit/>
+          </a:bodyPr>
+          <a:lstStyle/>
+          <a:p>
+            <a:pPr algn="ctr"/>
+            <a:r>
+              <a:rPr lang="en-US" sz="1400" dirty="0" smtClean="0"/>
+              <a:t>Fig. 11. Summary of </a:t>
+            </a:r>
+            <a:r>
+              <a:rPr lang="pl-PL" sz="1400" dirty="0" smtClean="0"/>
+              <a:t>the </a:t>
+            </a:r>
+            <a:r>
+              <a:rPr lang="en-US" sz="1400" dirty="0" smtClean="0"/>
+              <a:t>push events to the remote repository.</a:t>
+            </a:r>
+            <a:endParaRPr lang="en-US" sz="1400" dirty="0"/>
+          </a:p>
+        </p:txBody>
+      </p:sp>
+      <p:sp>
+        <p:nvSpPr>
+          <p:cNvPr id="7" name="Rectangle 6"/>
+          <p:cNvSpPr/>
+          <p:nvPr/>
+        </p:nvSpPr>
+        <p:spPr>
+          <a:xfrm>
+            <a:off x="789316" y="1450458"/>
+            <a:ext cx="8255480" cy="3554819"/>
+          </a:xfrm>
+          <a:prstGeom prst="rect">
+            <a:avLst/>
+          </a:prstGeom>
+        </p:spPr>
+        <p:txBody>
+          <a:bodyPr wrap="square">
+            <a:spAutoFit/>
+          </a:bodyPr>
+          <a:lstStyle/>
+          <a:p>
+            <a:r>
+              <a:rPr lang="en-US" sz="1500" dirty="0" smtClean="0">
+                <a:latin typeface="+mj-lt"/>
+                <a:ea typeface="Times New Roman" panose="02020603050405020304" pitchFamily="18" charset="0"/>
+              </a:rPr>
+              <a:t>Summary of </a:t>
+            </a:r>
+            <a:r>
+              <a:rPr lang="pl-PL" sz="1500" dirty="0" smtClean="0">
+                <a:latin typeface="+mj-lt"/>
+                <a:ea typeface="Times New Roman" panose="02020603050405020304" pitchFamily="18" charset="0"/>
+              </a:rPr>
+              <a:t>the </a:t>
+            </a:r>
+            <a:r>
+              <a:rPr lang="en-US" sz="1500" dirty="0" smtClean="0">
+                <a:latin typeface="+mj-lt"/>
+                <a:ea typeface="Times New Roman" panose="02020603050405020304" pitchFamily="18" charset="0"/>
+              </a:rPr>
+              <a:t>software project artifacts the </a:t>
+            </a:r>
+            <a:r>
+              <a:rPr lang="en-US" sz="1500" dirty="0">
+                <a:latin typeface="+mj-lt"/>
+                <a:ea typeface="Times New Roman" panose="02020603050405020304" pitchFamily="18" charset="0"/>
+              </a:rPr>
+              <a:t>thesis is comprised </a:t>
+            </a:r>
+            <a:r>
+              <a:rPr lang="en-US" sz="1500" dirty="0" smtClean="0">
+                <a:latin typeface="+mj-lt"/>
+                <a:ea typeface="Times New Roman" panose="02020603050405020304" pitchFamily="18" charset="0"/>
+              </a:rPr>
+              <a:t>of</a:t>
+            </a:r>
+            <a:r>
+              <a:rPr lang="pl-PL" sz="1500" dirty="0" smtClean="0">
+                <a:latin typeface="+mj-lt"/>
+                <a:ea typeface="Times New Roman" panose="02020603050405020304" pitchFamily="18" charset="0"/>
+              </a:rPr>
+              <a:t>:</a:t>
+            </a:r>
+          </a:p>
+          <a:p>
+            <a:pPr marL="285750" indent="-285750">
+              <a:buFont typeface="Wingdings" panose="05000000000000000000" pitchFamily="2" charset="2"/>
+              <a:buChar char="Ø"/>
+            </a:pPr>
+            <a:r>
+              <a:rPr lang="en-US" sz="1500" dirty="0" smtClean="0">
+                <a:latin typeface="+mj-lt"/>
+                <a:ea typeface="Times New Roman" panose="02020603050405020304" pitchFamily="18" charset="0"/>
+              </a:rPr>
+              <a:t>Application: </a:t>
+            </a:r>
+          </a:p>
+          <a:p>
+            <a:pPr marL="742950" lvl="1" indent="-285750">
+              <a:buFont typeface="Arial" panose="020B0604020202020204" pitchFamily="34" charset="0"/>
+              <a:buChar char="•"/>
+            </a:pPr>
+            <a:r>
+              <a:rPr lang="en-US" sz="1500" dirty="0" smtClean="0">
+                <a:latin typeface="+mj-lt"/>
+                <a:ea typeface="Times New Roman" panose="02020603050405020304" pitchFamily="18" charset="0"/>
+              </a:rPr>
+              <a:t>more than </a:t>
+            </a:r>
+            <a:r>
+              <a:rPr lang="en-US" sz="1500" b="1" dirty="0" smtClean="0">
+                <a:latin typeface="+mj-lt"/>
+                <a:ea typeface="Times New Roman" panose="02020603050405020304" pitchFamily="18" charset="0"/>
+              </a:rPr>
+              <a:t>5000 lines of code in Java </a:t>
+            </a:r>
+            <a:r>
+              <a:rPr lang="en-US" sz="1500" dirty="0" smtClean="0">
+                <a:latin typeface="+mj-lt"/>
+                <a:ea typeface="Times New Roman" panose="02020603050405020304" pitchFamily="18" charset="0"/>
+              </a:rPr>
+              <a:t>(refactored multiple times to be testable)</a:t>
+            </a:r>
+            <a:r>
+              <a:rPr lang="pl-PL" sz="1500" dirty="0" smtClean="0">
+                <a:latin typeface="+mj-lt"/>
+                <a:ea typeface="Times New Roman" panose="02020603050405020304" pitchFamily="18" charset="0"/>
+              </a:rPr>
+              <a:t>,</a:t>
+            </a:r>
+            <a:endParaRPr lang="en-US" sz="1500" dirty="0" smtClean="0">
+              <a:latin typeface="+mj-lt"/>
+              <a:ea typeface="Times New Roman" panose="02020603050405020304" pitchFamily="18" charset="0"/>
+            </a:endParaRPr>
+          </a:p>
+          <a:p>
+            <a:pPr marL="285750" indent="-285750">
+              <a:buFont typeface="Wingdings" panose="05000000000000000000" pitchFamily="2" charset="2"/>
+              <a:buChar char="Ø"/>
+            </a:pPr>
+            <a:r>
+              <a:rPr lang="en-US" sz="1500" dirty="0" smtClean="0">
+                <a:latin typeface="+mj-lt"/>
+              </a:rPr>
+              <a:t>Tests: </a:t>
+            </a:r>
+          </a:p>
+          <a:p>
+            <a:pPr marL="742950" lvl="1" indent="-285750">
+              <a:buFont typeface="Arial" panose="020B0604020202020204" pitchFamily="34" charset="0"/>
+              <a:buChar char="•"/>
+            </a:pPr>
+            <a:r>
+              <a:rPr lang="en-US" sz="1500" b="1" dirty="0" smtClean="0">
+                <a:latin typeface="+mj-lt"/>
+              </a:rPr>
+              <a:t>173 tests in JUnit </a:t>
+            </a:r>
+            <a:r>
+              <a:rPr lang="en-US" sz="1500" dirty="0" smtClean="0">
+                <a:latin typeface="+mj-lt"/>
+              </a:rPr>
+              <a:t>(60% unit integration tests, 40% unit tests), 95 tests for TCP server,</a:t>
+            </a:r>
+            <a:r>
+              <a:rPr lang="pl-PL" sz="1500" dirty="0">
+                <a:latin typeface="+mj-lt"/>
+              </a:rPr>
+              <a:t> </a:t>
+            </a:r>
+            <a:r>
+              <a:rPr lang="en-US" sz="1500" dirty="0" smtClean="0">
+                <a:latin typeface="+mj-lt"/>
+              </a:rPr>
+              <a:t>78 tests for TCP client (updated multiple times to be stable)</a:t>
+            </a:r>
+            <a:r>
+              <a:rPr lang="pl-PL" sz="1500" dirty="0" smtClean="0">
+                <a:latin typeface="+mj-lt"/>
+              </a:rPr>
+              <a:t>,</a:t>
+            </a:r>
+            <a:endParaRPr lang="en-US" sz="1500" dirty="0" smtClean="0">
+              <a:latin typeface="+mj-lt"/>
+            </a:endParaRPr>
+          </a:p>
+          <a:p>
+            <a:pPr marL="742950" lvl="1" indent="-285750">
+              <a:buFont typeface="Arial" panose="020B0604020202020204" pitchFamily="34" charset="0"/>
+              <a:buChar char="•"/>
+            </a:pPr>
+            <a:r>
+              <a:rPr lang="en-US" sz="1500" b="1" dirty="0" smtClean="0">
+                <a:latin typeface="+mj-lt"/>
+              </a:rPr>
+              <a:t>sanity check </a:t>
+            </a:r>
+            <a:r>
+              <a:rPr lang="en-US" sz="1500" dirty="0" smtClean="0">
+                <a:latin typeface="+mj-lt"/>
+              </a:rPr>
+              <a:t>- comprehensive integration test</a:t>
+            </a:r>
+            <a:r>
+              <a:rPr lang="pl-PL" sz="1500" dirty="0" smtClean="0">
+                <a:latin typeface="+mj-lt"/>
+              </a:rPr>
+              <a:t>,</a:t>
+            </a:r>
+            <a:endParaRPr lang="en-US" sz="1500" dirty="0" smtClean="0">
+              <a:latin typeface="+mj-lt"/>
+            </a:endParaRPr>
+          </a:p>
+          <a:p>
+            <a:pPr marL="285750" indent="-285750">
+              <a:buFont typeface="Wingdings" panose="05000000000000000000" pitchFamily="2" charset="2"/>
+              <a:buChar char="Ø"/>
+            </a:pPr>
+            <a:r>
+              <a:rPr lang="en-US" sz="1500" dirty="0" smtClean="0">
+                <a:latin typeface="+mj-lt"/>
+              </a:rPr>
+              <a:t>Build configuration for the project: </a:t>
+            </a:r>
+          </a:p>
+          <a:p>
+            <a:pPr marL="742950" lvl="1" indent="-285750">
+              <a:buFont typeface="Arial" panose="020B0604020202020204" pitchFamily="34" charset="0"/>
+              <a:buChar char="•"/>
+            </a:pPr>
+            <a:r>
+              <a:rPr lang="en-US" sz="1500" b="1" dirty="0" smtClean="0">
+                <a:latin typeface="+mj-lt"/>
+              </a:rPr>
+              <a:t>2 </a:t>
+            </a:r>
+            <a:r>
+              <a:rPr lang="pl-PL" sz="1500" b="1" dirty="0" smtClean="0">
+                <a:latin typeface="+mj-lt"/>
+              </a:rPr>
+              <a:t>Maven </a:t>
+            </a:r>
+            <a:r>
+              <a:rPr lang="en-US" sz="1500" b="1" dirty="0" smtClean="0">
+                <a:latin typeface="+mj-lt"/>
+              </a:rPr>
+              <a:t>POM files</a:t>
+            </a:r>
+            <a:r>
+              <a:rPr lang="pl-PL" sz="1500" dirty="0" smtClean="0">
+                <a:latin typeface="+mj-lt"/>
+              </a:rPr>
+              <a:t>,</a:t>
+            </a:r>
+            <a:endParaRPr lang="en-US" sz="1500" dirty="0" smtClean="0">
+              <a:latin typeface="+mj-lt"/>
+            </a:endParaRPr>
+          </a:p>
+          <a:p>
+            <a:pPr marL="285750" indent="-285750">
+              <a:buFont typeface="Wingdings" panose="05000000000000000000" pitchFamily="2" charset="2"/>
+              <a:buChar char="Ø"/>
+            </a:pPr>
+            <a:r>
+              <a:rPr lang="en-US" sz="1500" dirty="0" smtClean="0">
+                <a:latin typeface="+mj-lt"/>
+              </a:rPr>
+              <a:t>Optimal test suite selector:</a:t>
+            </a:r>
+          </a:p>
+          <a:p>
+            <a:pPr marL="742950" lvl="1" indent="-285750">
+              <a:buFont typeface="Arial" panose="020B0604020202020204" pitchFamily="34" charset="0"/>
+              <a:buChar char="•"/>
+            </a:pPr>
+            <a:r>
+              <a:rPr lang="en-US" sz="1500" dirty="0" smtClean="0">
+                <a:latin typeface="+mj-lt"/>
+                <a:ea typeface="Times New Roman" panose="02020603050405020304" pitchFamily="18" charset="0"/>
+              </a:rPr>
+              <a:t>more than </a:t>
+            </a:r>
+            <a:r>
+              <a:rPr lang="en-US" sz="1500" b="1" dirty="0" smtClean="0">
+                <a:latin typeface="+mj-lt"/>
+                <a:ea typeface="Times New Roman" panose="02020603050405020304" pitchFamily="18" charset="0"/>
+              </a:rPr>
+              <a:t>2000 lines of code in Python</a:t>
+            </a:r>
+            <a:r>
+              <a:rPr lang="pl-PL" sz="1500" b="1" dirty="0" smtClean="0">
+                <a:latin typeface="+mj-lt"/>
+                <a:ea typeface="Times New Roman" panose="02020603050405020304" pitchFamily="18" charset="0"/>
+              </a:rPr>
+              <a:t> </a:t>
+            </a:r>
+            <a:r>
+              <a:rPr lang="en-US" sz="1500" dirty="0" smtClean="0">
+                <a:latin typeface="+mj-lt"/>
+                <a:ea typeface="Times New Roman" panose="02020603050405020304" pitchFamily="18" charset="0"/>
+              </a:rPr>
+              <a:t>(powered by </a:t>
+            </a:r>
+            <a:r>
+              <a:rPr lang="en-US" sz="1500" b="1" dirty="0" smtClean="0">
+                <a:latin typeface="+mj-lt"/>
+                <a:ea typeface="Times New Roman" panose="02020603050405020304" pitchFamily="18" charset="0"/>
+              </a:rPr>
+              <a:t>GitPython</a:t>
+            </a:r>
+            <a:r>
+              <a:rPr lang="en-US" sz="1500" dirty="0" smtClean="0">
+                <a:latin typeface="+mj-lt"/>
+                <a:ea typeface="Times New Roman" panose="02020603050405020304" pitchFamily="18" charset="0"/>
+              </a:rPr>
+              <a:t> lib.),</a:t>
+            </a:r>
+          </a:p>
+          <a:p>
+            <a:pPr marL="285750" indent="-285750">
+              <a:buFont typeface="Wingdings" panose="05000000000000000000" pitchFamily="2" charset="2"/>
+              <a:buChar char="Ø"/>
+            </a:pPr>
+            <a:r>
+              <a:rPr lang="en-US" sz="1500" dirty="0" smtClean="0">
+                <a:latin typeface="+mj-lt"/>
+                <a:ea typeface="Times New Roman" panose="02020603050405020304" pitchFamily="18" charset="0"/>
+              </a:rPr>
+              <a:t>Jenkins:</a:t>
+            </a:r>
+          </a:p>
+          <a:p>
+            <a:pPr marL="742950" lvl="1" indent="-285750">
+              <a:buFont typeface="Arial" panose="020B0604020202020204" pitchFamily="34" charset="0"/>
+              <a:buChar char="•"/>
+            </a:pPr>
+            <a:r>
+              <a:rPr lang="en-US" sz="1500" b="1" dirty="0" smtClean="0">
+                <a:latin typeface="+mj-lt"/>
+                <a:ea typeface="Times New Roman" panose="02020603050405020304" pitchFamily="18" charset="0"/>
+              </a:rPr>
+              <a:t>5 Jenkins jobs </a:t>
+            </a:r>
+            <a:r>
+              <a:rPr lang="en-US" sz="1500" dirty="0" smtClean="0">
+                <a:latin typeface="+mj-lt"/>
+                <a:ea typeface="Times New Roman" panose="02020603050405020304" pitchFamily="18" charset="0"/>
+              </a:rPr>
+              <a:t>and </a:t>
+            </a:r>
+            <a:r>
+              <a:rPr lang="en-US" sz="1500" b="1" dirty="0" smtClean="0">
+                <a:ea typeface="Times New Roman" panose="02020603050405020304" pitchFamily="18" charset="0"/>
+              </a:rPr>
+              <a:t>Jenkins </a:t>
+            </a:r>
+            <a:r>
+              <a:rPr lang="en-US" sz="1500" b="1" dirty="0" smtClean="0">
+                <a:latin typeface="+mj-lt"/>
+                <a:ea typeface="Times New Roman" panose="02020603050405020304" pitchFamily="18" charset="0"/>
+              </a:rPr>
+              <a:t>build pipeline</a:t>
+            </a:r>
+            <a:r>
+              <a:rPr lang="en-US" sz="1500" dirty="0" smtClean="0">
+                <a:latin typeface="+mj-lt"/>
+                <a:ea typeface="Times New Roman" panose="02020603050405020304" pitchFamily="18" charset="0"/>
+              </a:rPr>
+              <a:t>.</a:t>
+            </a:r>
+          </a:p>
+          <a:p>
+            <a:endParaRPr lang="en-US" sz="1500" dirty="0">
+              <a:latin typeface="+mj-lt"/>
+            </a:endParaRPr>
+          </a:p>
+        </p:txBody>
+      </p:sp>
+      <p:pic>
+        <p:nvPicPr>
+          <p:cNvPr id="9" name="Picture 8"/>
+          <p:cNvPicPr>
+            <a:picLocks noChangeAspect="1"/>
+          </p:cNvPicPr>
+          <p:nvPr/>
+        </p:nvPicPr>
+        <p:blipFill>
+          <a:blip r:embed="rId2"/>
+          <a:stretch>
+            <a:fillRect/>
+          </a:stretch>
+        </p:blipFill>
+        <p:spPr>
+          <a:xfrm>
+            <a:off x="4140460" y="4774497"/>
+            <a:ext cx="4675736" cy="1661822"/>
+          </a:xfrm>
+          <a:prstGeom prst="rect">
+            <a:avLst/>
+          </a:prstGeom>
+        </p:spPr>
+      </p:pic>
+    </p:spTree>
+    <p:extLst>
+      <p:ext uri="{BB962C8B-B14F-4D97-AF65-F5344CB8AC3E}">
+        <p14:creationId xmlns:p14="http://schemas.microsoft.com/office/powerpoint/2010/main" val="1987103066"/>
+      </p:ext>
+    </p:extLst>
+  </p:cSld>
+  <p:clrMapOvr>
+    <a:masterClrMapping/>
+  </p:clrMapOvr>
+</p:sld>
+</file>
+
+<file path=ppt/slides/slide17.xml><?xml version="1.0" encoding="utf-8"?>
+<p:sld xmlns:a="http://schemas.openxmlformats.org/drawingml/2006/main" xmlns:r="http://schemas.openxmlformats.org/officeDocument/2006/relationships" xmlns:p="http://schemas.openxmlformats.org/presentationml/2006/main">
+  <p:cSld>
+    <p:spTree>
+      <p:nvGrpSpPr>
+        <p:cNvPr id="1" name=""/>
+        <p:cNvGrpSpPr/>
+        <p:nvPr/>
+      </p:nvGrpSpPr>
+      <p:grpSpPr>
+        <a:xfrm>
+          <a:off x="0" y="0"/>
+          <a:ext cx="0" cy="0"/>
+          <a:chOff x="0" y="0"/>
+          <a:chExt cx="0" cy="0"/>
+        </a:xfrm>
+      </p:grpSpPr>
+      <p:sp>
+        <p:nvSpPr>
+          <p:cNvPr id="2" name="Tytuł 1"/>
+          <p:cNvSpPr>
+            <a:spLocks noGrp="1"/>
+          </p:cNvSpPr>
+          <p:nvPr>
+            <p:ph type="title"/>
+          </p:nvPr>
+        </p:nvSpPr>
+        <p:spPr/>
+        <p:txBody>
+          <a:bodyPr/>
+          <a:lstStyle/>
+          <a:p>
+            <a:r>
+              <a:rPr lang="en-US" sz="2800" dirty="0" smtClean="0"/>
+              <a:t>Bibliography</a:t>
+            </a:r>
+            <a:endParaRPr lang="en-US" sz="2800" dirty="0"/>
+          </a:p>
+        </p:txBody>
+      </p:sp>
+      <p:sp>
+        <p:nvSpPr>
+          <p:cNvPr id="3" name="Symbol zastępczy zawartości 2"/>
+          <p:cNvSpPr>
+            <a:spLocks noGrp="1"/>
+          </p:cNvSpPr>
+          <p:nvPr>
+            <p:ph idx="1"/>
+          </p:nvPr>
+        </p:nvSpPr>
+        <p:spPr>
+          <a:xfrm>
+            <a:off x="551145" y="1628775"/>
+            <a:ext cx="8135655" cy="4497388"/>
+          </a:xfrm>
+        </p:spPr>
+        <p:txBody>
+          <a:bodyPr/>
+          <a:lstStyle/>
+          <a:p>
+            <a:pPr marL="0" indent="0">
+              <a:buNone/>
+            </a:pPr>
+            <a:endParaRPr lang="pl-PL" sz="1500" dirty="0" smtClean="0"/>
+          </a:p>
+          <a:p>
+            <a:pPr marL="0" indent="0">
+              <a:buNone/>
+            </a:pPr>
+            <a:r>
+              <a:rPr lang="en-US" sz="1500" dirty="0" smtClean="0"/>
+              <a:t>[1]  - Continuous Integration: important principles and practices.</a:t>
+            </a:r>
+          </a:p>
+          <a:p>
+            <a:pPr marL="0" indent="0">
+              <a:buNone/>
+            </a:pPr>
+            <a:r>
+              <a:rPr lang="en-US" sz="1500" dirty="0" smtClean="0"/>
+              <a:t>Available: https://www.thoughtworks.com/continuous-integration (visited September 14th, 2018) </a:t>
+            </a:r>
+          </a:p>
+          <a:p>
+            <a:pPr marL="0" indent="0">
+              <a:buNone/>
+            </a:pPr>
+            <a:endParaRPr lang="en-US" sz="1500" dirty="0" smtClean="0"/>
+          </a:p>
+          <a:p>
+            <a:pPr marL="0" indent="0">
+              <a:buNone/>
+            </a:pPr>
+            <a:r>
+              <a:rPr lang="en-US" sz="1500" dirty="0" smtClean="0"/>
+              <a:t>[2]  - Github public repository: CI_tool_for_an_optimal_test_suite_selection</a:t>
+            </a:r>
+          </a:p>
+          <a:p>
+            <a:pPr marL="0" indent="0">
+              <a:buNone/>
+            </a:pPr>
+            <a:r>
+              <a:rPr lang="en-US" sz="1500" dirty="0" smtClean="0"/>
+              <a:t>Available: https://github.com/AndSze/CI_tool_for_an_optimal_test_suite_selection</a:t>
+            </a:r>
+          </a:p>
+          <a:p>
+            <a:pPr marL="0" indent="0">
+              <a:buNone/>
+            </a:pPr>
+            <a:endParaRPr lang="en-US" sz="1500" dirty="0" smtClean="0"/>
+          </a:p>
+          <a:p>
+            <a:pPr marL="0" indent="0">
+              <a:buNone/>
+            </a:pPr>
+            <a:r>
+              <a:rPr lang="en-US" sz="1500" dirty="0" smtClean="0"/>
+              <a:t>[3]  - </a:t>
+            </a:r>
+            <a:r>
+              <a:rPr lang="en-US" sz="1500" dirty="0" smtClean="0"/>
+              <a:t>Top benefits of continuous integration.</a:t>
+            </a:r>
+          </a:p>
+          <a:p>
+            <a:pPr marL="0" indent="0">
+              <a:buNone/>
+            </a:pPr>
+            <a:r>
+              <a:rPr lang="en-US" sz="1500" dirty="0" smtClean="0"/>
+              <a:t>Available: https://apiumtech.com/blog/top-benefits-of-continuous-integration-2/ (visited September 14th, 2018) </a:t>
+            </a:r>
+          </a:p>
+          <a:p>
+            <a:pPr marL="0" indent="0">
+              <a:buNone/>
+            </a:pPr>
+            <a:endParaRPr lang="en-GB" dirty="0"/>
+          </a:p>
+        </p:txBody>
+      </p:sp>
+      <p:sp>
+        <p:nvSpPr>
+          <p:cNvPr id="6" name="Symbol zastępczy numeru slajdu 5"/>
+          <p:cNvSpPr>
+            <a:spLocks noGrp="1"/>
+          </p:cNvSpPr>
+          <p:nvPr>
+            <p:ph type="sldNum" sz="quarter" idx="12"/>
+          </p:nvPr>
+        </p:nvSpPr>
+        <p:spPr/>
+        <p:txBody>
+          <a:bodyPr/>
+          <a:lstStyle/>
+          <a:p>
+            <a:pPr>
+              <a:defRPr/>
+            </a:pPr>
+            <a:fld id="{A62F389E-D7CB-4405-90CE-93B848A33135}" type="slidenum">
+              <a:rPr lang="pl-PL" smtClean="0"/>
+              <a:pPr>
+                <a:defRPr/>
+              </a:pPr>
+              <a:t>17</a:t>
+            </a:fld>
+            <a:endParaRPr lang="pl-PL" dirty="0"/>
+          </a:p>
+        </p:txBody>
+      </p:sp>
+    </p:spTree>
+    <p:extLst>
+      <p:ext uri="{BB962C8B-B14F-4D97-AF65-F5344CB8AC3E}">
+        <p14:creationId xmlns:p14="http://schemas.microsoft.com/office/powerpoint/2010/main" val="2498903104"/>
       </p:ext>
     </p:extLst>
   </p:cSld>
@@ -6902,11 +8675,7 @@
           <a:p>
             <a:r>
               <a:rPr lang="en-US" sz="2500" dirty="0" smtClean="0"/>
-              <a:t>Motivation to take</a:t>
-            </a:r>
-            <a:r>
-              <a:rPr lang="en-US" sz="2500" dirty="0" smtClean="0"/>
-              <a:t> up the subject of CI</a:t>
+              <a:t>Motivation to take up the subject of CI</a:t>
             </a:r>
             <a:endParaRPr lang="en-US" sz="2500" dirty="0"/>
           </a:p>
@@ -7065,12 +8834,8 @@
               <a:t> in the </a:t>
             </a:r>
             <a:r>
-              <a:rPr lang="pl-PL" sz="1500" dirty="0" err="1" smtClean="0"/>
-              <a:t>project</a:t>
-            </a:r>
-            <a:r>
               <a:rPr lang="en-US" sz="1500" dirty="0" smtClean="0"/>
-              <a:t> </a:t>
+              <a:t>project </a:t>
             </a:r>
             <a:r>
               <a:rPr lang="pl-PL" sz="1500" dirty="0" smtClean="0"/>
@@ -7103,28 +8868,44 @@
           </a:p>
           <a:p>
             <a:r>
+              <a:rPr lang="pl-PL" sz="1500" b="1" dirty="0" smtClean="0"/>
+              <a:t>Build </a:t>
+            </a:r>
+            <a:r>
               <a:rPr lang="en-US" sz="1500" b="1" dirty="0" smtClean="0"/>
-              <a:t>Software</a:t>
-            </a:r>
-            <a:r>
-              <a:rPr lang="en-US" sz="1500" dirty="0" smtClean="0"/>
-              <a:t> </a:t>
+              <a:t>process </a:t>
             </a:r>
             <a:r>
               <a:rPr lang="en-US" sz="1500" b="1" dirty="0" smtClean="0"/>
-              <a:t>build process and configuration management not well defined,</a:t>
+              <a:t>and configuration management not well defined,</a:t>
             </a:r>
           </a:p>
           <a:p>
             <a:r>
               <a:rPr lang="en-US" sz="1500" b="1" dirty="0" smtClean="0"/>
-              <a:t>Need to build 3 separate projects prior to loading the firmware.</a:t>
-            </a:r>
-          </a:p>
-          <a:p>
+              <a:t>Need to build 3 separate projects prior to loading the </a:t>
+            </a:r>
             <a:r>
               <a:rPr lang="en-US" sz="1500" b="1" dirty="0" smtClean="0"/>
-              <a:t>If a test fails, can it be stated with absolute certainty that a bug is found?</a:t>
+              <a:t>firmware</a:t>
+            </a:r>
+            <a:r>
+              <a:rPr lang="pl-PL" sz="1500" b="1" dirty="0" smtClean="0"/>
+              <a:t> – </a:t>
+            </a:r>
+            <a:r>
+              <a:rPr lang="en-US" sz="1500" b="1" dirty="0" smtClean="0"/>
+              <a:t>major integration issues. </a:t>
+            </a:r>
+          </a:p>
+          <a:p>
+            <a:r>
+              <a:rPr lang="en-US" sz="1500" b="1" dirty="0" smtClean="0"/>
+              <a:t>If </a:t>
+            </a:r>
+            <a:r>
+              <a:rPr lang="en-US" sz="1500" b="1" dirty="0" smtClean="0"/>
+              <a:t>a test fails, can it be stated with absolute certainty that a bug is found?</a:t>
             </a:r>
           </a:p>
           <a:p>
@@ -7308,8 +9089,12 @@
               <a:buNone/>
             </a:pPr>
             <a:r>
-              <a:rPr lang="en-US" sz="1600" dirty="0" smtClean="0"/>
-              <a:t>	Continuous Integration (CI) is a development practice that requires developers to integrate code into a shared repository several times a day. The starting point when implementing continuous integration is an assumption that a single command should have the capability of building the system.</a:t>
+              <a:rPr lang="en-US" sz="1500" dirty="0" smtClean="0"/>
+              <a:t>Continuous </a:t>
+            </a:r>
+            <a:r>
+              <a:rPr lang="en-US" sz="1500" dirty="0" smtClean="0"/>
+              <a:t>Integration (CI) is a development practice that requires developers to integrate code into a shared repository several times a day. The starting point when implementing continuous integration is an assumption that a single command should have the capability of building the system.</a:t>
             </a:r>
           </a:p>
           <a:p>
@@ -7317,7 +9102,7 @@
               <a:buNone/>
             </a:pPr>
             <a:r>
-              <a:rPr lang="en-US" sz="1600" dirty="0" smtClean="0"/>
+              <a:rPr lang="en-US" sz="1500" dirty="0" smtClean="0"/>
               <a:t> </a:t>
             </a:r>
           </a:p>
@@ -7326,82 +9111,109 @@
               <a:buNone/>
             </a:pPr>
             <a:r>
-              <a:rPr lang="en-US" sz="1600" dirty="0" smtClean="0"/>
-              <a:t>	There are two main objectives of CI: </a:t>
-            </a:r>
-            <a:r>
-              <a:rPr lang="en-US" sz="1600" dirty="0" smtClean="0"/>
-              <a:t>build and test software automatically and provide developers with immediate feedback about quality of the last code build. </a:t>
-            </a:r>
-            <a:r>
-              <a:rPr lang="pl-PL" sz="1600" dirty="0" smtClean="0"/>
+              <a:rPr lang="en-US" sz="1500" dirty="0" smtClean="0"/>
+              <a:t>There </a:t>
+            </a:r>
+            <a:r>
+              <a:rPr lang="en-US" sz="1500" dirty="0" smtClean="0"/>
+              <a:t>are two main objectives of CI: build and test software automatically and provide developers with immediate feedback about quality of the last code build. </a:t>
+            </a:r>
+            <a:r>
+              <a:rPr lang="pl-PL" sz="1500" dirty="0" smtClean="0"/>
               <a:t>In order to </a:t>
             </a:r>
             <a:r>
-              <a:rPr lang="en-US" sz="1600" dirty="0" smtClean="0"/>
+              <a:rPr lang="en-US" sz="1500" dirty="0" smtClean="0"/>
               <a:t>achieve those objectives, continuous integration relies on the following principles [1]:</a:t>
             </a:r>
           </a:p>
           <a:p>
-            <a:pPr lvl="0" algn="just"/>
-            <a:r>
-              <a:rPr lang="en-US" sz="1600" dirty="0" smtClean="0"/>
+            <a:pPr lvl="1" algn="just">
+              <a:buFont typeface="Arial" panose="020B0604020202020204" pitchFamily="34" charset="0"/>
+              <a:buChar char="•"/>
+            </a:pPr>
+            <a:r>
+              <a:rPr lang="en-US" sz="1500" dirty="0" smtClean="0"/>
               <a:t>Maintain a code repository,</a:t>
             </a:r>
           </a:p>
           <a:p>
-            <a:pPr lvl="0" algn="just"/>
-            <a:r>
-              <a:rPr lang="en-US" sz="1600" dirty="0" smtClean="0"/>
+            <a:pPr lvl="1" algn="just">
+              <a:buFont typeface="Arial" panose="020B0604020202020204" pitchFamily="34" charset="0"/>
+              <a:buChar char="•"/>
+            </a:pPr>
+            <a:r>
+              <a:rPr lang="en-US" sz="1500" dirty="0" smtClean="0"/>
               <a:t>Automate the build,</a:t>
             </a:r>
           </a:p>
           <a:p>
-            <a:pPr lvl="0" algn="just"/>
-            <a:r>
-              <a:rPr lang="en-US" sz="1600" dirty="0" smtClean="0"/>
+            <a:pPr lvl="1" algn="just">
+              <a:buFont typeface="Arial" panose="020B0604020202020204" pitchFamily="34" charset="0"/>
+              <a:buChar char="•"/>
+            </a:pPr>
+            <a:r>
+              <a:rPr lang="en-US" sz="1500" dirty="0" smtClean="0"/>
               <a:t>Make the build self-testing,</a:t>
             </a:r>
           </a:p>
           <a:p>
-            <a:pPr lvl="0" algn="just"/>
-            <a:r>
-              <a:rPr lang="en-US" sz="1600" dirty="0" smtClean="0"/>
+            <a:pPr lvl="1" algn="just">
+              <a:buFont typeface="Arial" panose="020B0604020202020204" pitchFamily="34" charset="0"/>
+              <a:buChar char="•"/>
+            </a:pPr>
+            <a:r>
+              <a:rPr lang="en-US" sz="1500" dirty="0" smtClean="0"/>
               <a:t>Every commit should be built on an integration machine,</a:t>
             </a:r>
           </a:p>
           <a:p>
-            <a:pPr lvl="0" algn="just"/>
-            <a:r>
-              <a:rPr lang="en-US" sz="1600" dirty="0" smtClean="0"/>
+            <a:pPr lvl="1" algn="just">
+              <a:buFont typeface="Arial" panose="020B0604020202020204" pitchFamily="34" charset="0"/>
+              <a:buChar char="•"/>
+            </a:pPr>
+            <a:r>
+              <a:rPr lang="en-US" sz="1500" dirty="0" smtClean="0"/>
               <a:t>Keep the build fast,</a:t>
             </a:r>
           </a:p>
           <a:p>
-            <a:pPr lvl="0" algn="just"/>
-            <a:r>
-              <a:rPr lang="en-US" sz="1600" dirty="0" smtClean="0"/>
+            <a:pPr lvl="1" algn="just">
+              <a:buFont typeface="Arial" panose="020B0604020202020204" pitchFamily="34" charset="0"/>
+              <a:buChar char="•"/>
+            </a:pPr>
+            <a:r>
+              <a:rPr lang="en-US" sz="1500" dirty="0" smtClean="0"/>
               <a:t>Test in a clone of the production environment,</a:t>
             </a:r>
           </a:p>
           <a:p>
-            <a:pPr lvl="0" algn="just"/>
-            <a:r>
-              <a:rPr lang="en-US" sz="1600" dirty="0" smtClean="0"/>
+            <a:pPr lvl="1" algn="just">
+              <a:buFont typeface="Arial" panose="020B0604020202020204" pitchFamily="34" charset="0"/>
+              <a:buChar char="•"/>
+            </a:pPr>
+            <a:r>
+              <a:rPr lang="en-US" sz="1500" dirty="0" smtClean="0"/>
               <a:t>Make it easy for anyone to get the latest executable version,</a:t>
             </a:r>
           </a:p>
           <a:p>
-            <a:pPr lvl="0" algn="just"/>
-            <a:r>
-              <a:rPr lang="en-US" sz="1600" dirty="0" smtClean="0"/>
+            <a:pPr lvl="1" algn="just">
+              <a:buFont typeface="Arial" panose="020B0604020202020204" pitchFamily="34" charset="0"/>
+              <a:buChar char="•"/>
+            </a:pPr>
+            <a:r>
+              <a:rPr lang="en-US" sz="1500" dirty="0" smtClean="0"/>
               <a:t>Everyone can see the results of the latest build,</a:t>
             </a:r>
           </a:p>
           <a:p>
-            <a:pPr lvl="0" algn="just"/>
-            <a:r>
-              <a:rPr lang="en-US" sz="1600" dirty="0" smtClean="0"/>
+            <a:pPr lvl="1" algn="just">
+              <a:buFont typeface="Arial" panose="020B0604020202020204" pitchFamily="34" charset="0"/>
+              <a:buChar char="•"/>
+            </a:pPr>
+            <a:r>
+              <a:rPr lang="en-US" sz="1500" dirty="0" smtClean="0"/>
               <a:t>Automate deployment.</a:t>
             </a:r>
           </a:p>
@@ -7409,7 +9221,7 @@
             <a:pPr marL="0" indent="0" algn="just">
               <a:buNone/>
             </a:pPr>
-            <a:endParaRPr lang="en-GB" sz="1600" dirty="0" smtClean="0"/>
+            <a:endParaRPr lang="en-GB" sz="1500" dirty="0" smtClean="0"/>
           </a:p>
         </p:txBody>
       </p:sp>
@@ -7489,7 +9301,11 @@
           <a:p>
             <a:r>
               <a:rPr lang="en-US" sz="2400" dirty="0" smtClean="0"/>
-              <a:t>Proposed CI tool</a:t>
+              <a:t>Proposed </a:t>
+            </a:r>
+            <a:r>
+              <a:rPr lang="en-US" sz="2400" dirty="0" smtClean="0"/>
+              <a:t>CI tool</a:t>
             </a:r>
             <a:endParaRPr lang="en-US" sz="2400" dirty="0"/>
           </a:p>
@@ -7789,15 +9605,7 @@
           <a:p>
             <a:r>
               <a:rPr lang="en-US" sz="1400" dirty="0" smtClean="0"/>
-              <a:t>Fig. 1. Jenkins web interface for the build pipeline</a:t>
-            </a:r>
-            <a:r>
-              <a:rPr lang="en-US" sz="1400" dirty="0" smtClean="0"/>
-              <a:t> </a:t>
-            </a:r>
-            <a:r>
-              <a:rPr lang="en-US" sz="1400" dirty="0" smtClean="0"/>
-              <a:t>view. </a:t>
+              <a:t>Fig. 1. Jenkins web interface for the build pipeline view. </a:t>
             </a:r>
           </a:p>
           <a:p>
@@ -7945,7 +9753,7 @@
         </p:nvSpPr>
         <p:spPr>
           <a:xfrm>
-            <a:off x="669579" y="4919898"/>
+            <a:off x="669579" y="4928524"/>
             <a:ext cx="7796329" cy="307777"/>
           </a:xfrm>
           <a:prstGeom prst="rect">
@@ -8070,7 +9878,6 @@
               <a:rPr lang="en-US" sz="2400" dirty="0"/>
               <a:t>How does the CI tool work?</a:t>
             </a:r>
-            <a:endParaRPr lang="en-US" sz="2400" dirty="0"/>
           </a:p>
         </p:txBody>
       </p:sp>
@@ -8318,7 +10125,6 @@
               <a:rPr lang="en-US" sz="2400" dirty="0"/>
               <a:t>How does the CI tool work?</a:t>
             </a:r>
-            <a:endParaRPr lang="en-US" sz="2400" dirty="0"/>
           </a:p>
         </p:txBody>
       </p:sp>
@@ -8535,7 +10341,6 @@
               <a:rPr lang="en-US" sz="2400" dirty="0"/>
               <a:t>How does the CI tool work?</a:t>
             </a:r>
-            <a:endParaRPr lang="en-US" sz="2400" dirty="0"/>
           </a:p>
         </p:txBody>
       </p:sp>
@@ -8651,7 +10456,19 @@
             </a:r>
             <a:r>
               <a:rPr lang="en-US" sz="1400" dirty="0" smtClean="0"/>
-              <a:t>execution of the entire test suite for tcpserver package.</a:t>
+              <a:t>execution of the entire test suite for </a:t>
+            </a:r>
+            <a:r>
+              <a:rPr lang="pl-PL" sz="1400" dirty="0" smtClean="0"/>
+              <a:t>TCP </a:t>
+            </a:r>
+            <a:r>
+              <a:rPr lang="pl-PL" sz="1400" dirty="0" err="1" smtClean="0"/>
+              <a:t>server</a:t>
+            </a:r>
+            <a:r>
+              <a:rPr lang="en-US" sz="1400" dirty="0" smtClean="0"/>
+              <a:t>.</a:t>
             </a:r>
             <a:endParaRPr lang="en-US" sz="1400" dirty="0"/>
           </a:p>

</xml_diff>

<commit_message>
Final version of the Master's thesis after review
</commit_message>
<xml_diff>
--- a/Andrzej_Szewczyk_Prezentacja_Seminarium_Dyplomowe.pptx
+++ b/Andrzej_Szewczyk_Prezentacja_Seminarium_Dyplomowe.pptx
@@ -158,7 +158,7 @@
   </p:defaultTextStyle>
   <p:extLst>
     <p:ext uri="{EFAFB233-063F-42B5-8137-9DF3F51BA10A}">
-      <p15:sldGuideLst xmlns:p15="http://schemas.microsoft.com/office/powerpoint/2012/main">
+      <p15:sldGuideLst xmlns:p15="http://schemas.microsoft.com/office/powerpoint/2012/main" xmlns="">
         <p15:guide id="1" orient="horz" pos="2160">
           <p15:clr>
             <a:srgbClr val="A4A3A4"/>
@@ -2350,7 +2350,7 @@
             </a:pPr>
             <a:fld id="{4221A833-F55D-40FD-A351-9E9F026D73CF}" type="datetime1">
               <a:rPr lang="en-US" smtClean="0"/>
-              <a:t>9/14/2018</a:t>
+              <a:t>9/15/2018</a:t>
             </a:fld>
             <a:endParaRPr lang="pl-PL"/>
           </a:p>
@@ -2554,7 +2554,7 @@
             </a:pPr>
             <a:fld id="{B181401E-963E-4FE9-B50C-9BD8A6873177}" type="datetime1">
               <a:rPr lang="en-US" smtClean="0"/>
-              <a:t>9/14/2018</a:t>
+              <a:t>9/15/2018</a:t>
             </a:fld>
             <a:endParaRPr lang="pl-PL"/>
           </a:p>
@@ -2768,7 +2768,7 @@
             </a:pPr>
             <a:fld id="{6B876BFD-AD81-4A7A-A93A-05ED54BC0113}" type="datetime1">
               <a:rPr lang="en-US" smtClean="0"/>
-              <a:t>9/14/2018</a:t>
+              <a:t>9/15/2018</a:t>
             </a:fld>
             <a:endParaRPr lang="pl-PL"/>
           </a:p>
@@ -2976,7 +2976,7 @@
             </a:pPr>
             <a:fld id="{859C3E08-3856-4993-B2D5-3225FCBDF97C}" type="datetime1">
               <a:rPr lang="en-US" smtClean="0"/>
-              <a:t>9/14/2018</a:t>
+              <a:t>9/15/2018</a:t>
             </a:fld>
             <a:endParaRPr lang="pl-PL"/>
           </a:p>
@@ -3210,7 +3210,7 @@
             </a:pPr>
             <a:fld id="{D00F0917-26D6-46D5-A8B6-E18B437EF79B}" type="datetime1">
               <a:rPr lang="en-US" smtClean="0"/>
-              <a:t>9/14/2018</a:t>
+              <a:t>9/15/2018</a:t>
             </a:fld>
             <a:endParaRPr lang="pl-PL"/>
           </a:p>
@@ -3532,7 +3532,7 @@
             </a:pPr>
             <a:fld id="{E22165FA-3C55-4061-BECA-3BD5BB8E56CB}" type="datetime1">
               <a:rPr lang="en-US" smtClean="0"/>
-              <a:t>9/14/2018</a:t>
+              <a:t>9/15/2018</a:t>
             </a:fld>
             <a:endParaRPr lang="pl-PL"/>
           </a:p>
@@ -3993,7 +3993,7 @@
             </a:pPr>
             <a:fld id="{4C65C24E-8FFF-495E-B3A3-0FD7BAA3E560}" type="datetime1">
               <a:rPr lang="en-US" smtClean="0"/>
-              <a:t>9/14/2018</a:t>
+              <a:t>9/15/2018</a:t>
             </a:fld>
             <a:endParaRPr lang="pl-PL"/>
           </a:p>
@@ -4145,7 +4145,7 @@
             </a:pPr>
             <a:fld id="{7C0CFBBD-1EE5-4D27-9A12-608198EECC63}" type="datetime1">
               <a:rPr lang="en-US" smtClean="0"/>
-              <a:t>9/14/2018</a:t>
+              <a:t>9/15/2018</a:t>
             </a:fld>
             <a:endParaRPr lang="pl-PL"/>
           </a:p>
@@ -4274,7 +4274,7 @@
             </a:pPr>
             <a:fld id="{D4A5FA91-EC9E-43A8-B3CB-830F6E2BDD09}" type="datetime1">
               <a:rPr lang="en-US" smtClean="0"/>
-              <a:t>9/14/2018</a:t>
+              <a:t>9/15/2018</a:t>
             </a:fld>
             <a:endParaRPr lang="pl-PL"/>
           </a:p>
@@ -4585,7 +4585,7 @@
             </a:pPr>
             <a:fld id="{CA5B0E47-5204-4743-9DE4-1ECDCEE7A901}" type="datetime1">
               <a:rPr lang="en-US" smtClean="0"/>
-              <a:t>9/14/2018</a:t>
+              <a:t>9/15/2018</a:t>
             </a:fld>
             <a:endParaRPr lang="pl-PL"/>
           </a:p>
@@ -4873,7 +4873,7 @@
             </a:pPr>
             <a:fld id="{F7933AFC-D8CF-4FFA-BC47-C586AD24B97C}" type="datetime1">
               <a:rPr lang="en-US" smtClean="0"/>
-              <a:t>9/14/2018</a:t>
+              <a:t>9/15/2018</a:t>
             </a:fld>
             <a:endParaRPr lang="pl-PL"/>
           </a:p>
@@ -5227,7 +5227,7 @@
             </a:pPr>
             <a:fld id="{814873AF-7426-4A08-9E1C-93101F0F686C}" type="datetime1">
               <a:rPr lang="en-US" smtClean="0"/>
-              <a:t>9/14/2018</a:t>
+              <a:t>9/15/2018</a:t>
             </a:fld>
             <a:endParaRPr lang="pl-PL"/>
           </a:p>
@@ -5847,11 +5847,7 @@
             </a:r>
             <a:r>
               <a:rPr lang="en-US" sz="2000" b="0" dirty="0" smtClean="0"/>
-              <a:t>Master’s thesis</a:t>
-            </a:r>
-            <a:r>
-              <a:rPr lang="en-US" sz="2000" b="0" dirty="0" smtClean="0"/>
-              <a:t>:</a:t>
+              <a:t>Master’s thesis:</a:t>
             </a:r>
             <a:r>
               <a:rPr lang="pl-PL" sz="2800" dirty="0" smtClean="0"/>
@@ -7246,7 +7242,6 @@
               <a:rPr lang="en-US" sz="1500" dirty="0" smtClean="0"/>
               <a:t>. </a:t>
             </a:r>
-            <a:endParaRPr lang="en-US" sz="1500" dirty="0" smtClean="0"/>
           </a:p>
         </p:txBody>
       </p:sp>
@@ -7760,7 +7755,7 @@
           <a:graphicData uri="http://schemas.openxmlformats.org/presentationml/2006/ole">
             <mc:AlternateContent xmlns:mc="http://schemas.openxmlformats.org/markup-compatibility/2006">
               <mc:Choice xmlns:v="urn:schemas-microsoft-com:vml" Requires="v">
-                <p:oleObj spid="_x0000_s1031" r:id="rId3" imgW="10315643" imgH="8534490" progId="Visio.Drawing.15">
+                <p:oleObj spid="_x0000_s1032" r:id="rId3" imgW="10315643" imgH="8534490" progId="Visio.Drawing.15">
                   <p:embed/>
                 </p:oleObj>
               </mc:Choice>
@@ -7851,7 +7846,19 @@
             </a:r>
             <a:r>
               <a:rPr lang="en-US" sz="1400" dirty="0"/>
-              <a:t>types of  the software life cycle work products with an indication where the scope of the thesis applies to the software development process.</a:t>
+              <a:t>types </a:t>
+            </a:r>
+            <a:r>
+              <a:rPr lang="en-US" sz="1400"/>
+              <a:t>of </a:t>
+            </a:r>
+            <a:r>
+              <a:rPr lang="en-US" sz="1400" smtClean="0"/>
+              <a:t>software </a:t>
+            </a:r>
+            <a:r>
+              <a:rPr lang="en-US" sz="1400" dirty="0"/>
+              <a:t>life cycle work products with an indication where the scope of the thesis applies to the software development process.</a:t>
             </a:r>
           </a:p>
         </p:txBody>
@@ -8575,11 +8582,7 @@
             </a:pPr>
             <a:r>
               <a:rPr lang="en-US" sz="1500" dirty="0" smtClean="0"/>
-              <a:t>[3]  - </a:t>
-            </a:r>
-            <a:r>
-              <a:rPr lang="en-US" sz="1500" dirty="0" smtClean="0"/>
-              <a:t>Top benefits of continuous integration.</a:t>
+              <a:t>[3]  - Top benefits of continuous integration.</a:t>
             </a:r>
           </a:p>
           <a:p>
@@ -8873,21 +8876,13 @@
             </a:r>
             <a:r>
               <a:rPr lang="en-US" sz="1500" b="1" dirty="0" smtClean="0"/>
-              <a:t>process </a:t>
-            </a:r>
+              <a:t>process and configuration management not well defined,</a:t>
+            </a:r>
+          </a:p>
+          <a:p>
             <a:r>
               <a:rPr lang="en-US" sz="1500" b="1" dirty="0" smtClean="0"/>
-              <a:t>and configuration management not well defined,</a:t>
-            </a:r>
-          </a:p>
-          <a:p>
-            <a:r>
-              <a:rPr lang="en-US" sz="1500" b="1" dirty="0" smtClean="0"/>
-              <a:t>Need to build 3 separate projects prior to loading the </a:t>
-            </a:r>
-            <a:r>
-              <a:rPr lang="en-US" sz="1500" b="1" dirty="0" smtClean="0"/>
-              <a:t>firmware</a:t>
+              <a:t>Need to build 3 separate projects prior to loading the firmware</a:t>
             </a:r>
             <a:r>
               <a:rPr lang="pl-PL" sz="1500" b="1" dirty="0" smtClean="0"/>
@@ -8901,11 +8896,7 @@
           <a:p>
             <a:r>
               <a:rPr lang="en-US" sz="1500" b="1" dirty="0" smtClean="0"/>
-              <a:t>If </a:t>
-            </a:r>
-            <a:r>
-              <a:rPr lang="en-US" sz="1500" b="1" dirty="0" smtClean="0"/>
-              <a:t>a test fails, can it be stated with absolute certainty that a bug is found?</a:t>
+              <a:t>If a test fails, can it be stated with absolute certainty that a bug is found?</a:t>
             </a:r>
           </a:p>
           <a:p>
@@ -9090,11 +9081,7 @@
             </a:pPr>
             <a:r>
               <a:rPr lang="en-US" sz="1500" dirty="0" smtClean="0"/>
-              <a:t>Continuous </a:t>
-            </a:r>
-            <a:r>
-              <a:rPr lang="en-US" sz="1500" dirty="0" smtClean="0"/>
-              <a:t>Integration (CI) is a development practice that requires developers to integrate code into a shared repository several times a day. The starting point when implementing continuous integration is an assumption that a single command should have the capability of building the system.</a:t>
+              <a:t>Continuous Integration (CI) is a development practice that requires developers to integrate code into a shared repository several times a day. The starting point when implementing continuous integration is an assumption that a single command should have the capability of building the system.</a:t>
             </a:r>
           </a:p>
           <a:p>
@@ -9112,11 +9099,7 @@
             </a:pPr>
             <a:r>
               <a:rPr lang="en-US" sz="1500" dirty="0" smtClean="0"/>
-              <a:t>There </a:t>
-            </a:r>
-            <a:r>
-              <a:rPr lang="en-US" sz="1500" dirty="0" smtClean="0"/>
-              <a:t>are two main objectives of CI: build and test software automatically and provide developers with immediate feedback about quality of the last code build. </a:t>
+              <a:t>There are two main objectives of CI: build and test software automatically and provide developers with immediate feedback about quality of the last code build. </a:t>
             </a:r>
             <a:r>
               <a:rPr lang="pl-PL" sz="1500" dirty="0" smtClean="0"/>
@@ -9301,11 +9284,7 @@
           <a:p>
             <a:r>
               <a:rPr lang="en-US" sz="2400" dirty="0" smtClean="0"/>
-              <a:t>Proposed </a:t>
-            </a:r>
-            <a:r>
-              <a:rPr lang="en-US" sz="2400" dirty="0" smtClean="0"/>
-              <a:t>CI tool</a:t>
+              <a:t>Proposed CI tool</a:t>
             </a:r>
             <a:endParaRPr lang="en-US" sz="2400" dirty="0"/>
           </a:p>

</xml_diff>